<commit_message>
Last LC04 changes before lecture
</commit_message>
<xml_diff>
--- a/Leçons/Lecons de chimie 2019-2020/LC04.pptx
+++ b/Leçons/Lecons de chimie 2019-2020/LC04.pptx
@@ -256,7 +256,7 @@
           <a:p>
             <a:fld id="{C262451B-073C-4FAC-8D0B-6648421A7945}" type="datetimeFigureOut">
               <a:rPr lang="fr-FR" smtClean="0"/>
-              <a:t>16/11/2019</a:t>
+              <a:t>20/11/2019</a:t>
             </a:fld>
             <a:endParaRPr lang="fr-FR"/>
           </a:p>
@@ -426,7 +426,7 @@
           <a:p>
             <a:fld id="{C262451B-073C-4FAC-8D0B-6648421A7945}" type="datetimeFigureOut">
               <a:rPr lang="fr-FR" smtClean="0"/>
-              <a:t>16/11/2019</a:t>
+              <a:t>20/11/2019</a:t>
             </a:fld>
             <a:endParaRPr lang="fr-FR"/>
           </a:p>
@@ -606,7 +606,7 @@
           <a:p>
             <a:fld id="{C262451B-073C-4FAC-8D0B-6648421A7945}" type="datetimeFigureOut">
               <a:rPr lang="fr-FR" smtClean="0"/>
-              <a:t>16/11/2019</a:t>
+              <a:t>20/11/2019</a:t>
             </a:fld>
             <a:endParaRPr lang="fr-FR"/>
           </a:p>
@@ -776,7 +776,7 @@
           <a:p>
             <a:fld id="{C262451B-073C-4FAC-8D0B-6648421A7945}" type="datetimeFigureOut">
               <a:rPr lang="fr-FR" smtClean="0"/>
-              <a:t>16/11/2019</a:t>
+              <a:t>20/11/2019</a:t>
             </a:fld>
             <a:endParaRPr lang="fr-FR"/>
           </a:p>
@@ -1022,7 +1022,7 @@
           <a:p>
             <a:fld id="{C262451B-073C-4FAC-8D0B-6648421A7945}" type="datetimeFigureOut">
               <a:rPr lang="fr-FR" smtClean="0"/>
-              <a:t>16/11/2019</a:t>
+              <a:t>20/11/2019</a:t>
             </a:fld>
             <a:endParaRPr lang="fr-FR"/>
           </a:p>
@@ -1254,7 +1254,7 @@
           <a:p>
             <a:fld id="{C262451B-073C-4FAC-8D0B-6648421A7945}" type="datetimeFigureOut">
               <a:rPr lang="fr-FR" smtClean="0"/>
-              <a:t>16/11/2019</a:t>
+              <a:t>20/11/2019</a:t>
             </a:fld>
             <a:endParaRPr lang="fr-FR"/>
           </a:p>
@@ -1621,7 +1621,7 @@
           <a:p>
             <a:fld id="{C262451B-073C-4FAC-8D0B-6648421A7945}" type="datetimeFigureOut">
               <a:rPr lang="fr-FR" smtClean="0"/>
-              <a:t>16/11/2019</a:t>
+              <a:t>20/11/2019</a:t>
             </a:fld>
             <a:endParaRPr lang="fr-FR"/>
           </a:p>
@@ -1739,7 +1739,7 @@
           <a:p>
             <a:fld id="{C262451B-073C-4FAC-8D0B-6648421A7945}" type="datetimeFigureOut">
               <a:rPr lang="fr-FR" smtClean="0"/>
-              <a:t>16/11/2019</a:t>
+              <a:t>20/11/2019</a:t>
             </a:fld>
             <a:endParaRPr lang="fr-FR"/>
           </a:p>
@@ -1834,7 +1834,7 @@
           <a:p>
             <a:fld id="{C262451B-073C-4FAC-8D0B-6648421A7945}" type="datetimeFigureOut">
               <a:rPr lang="fr-FR" smtClean="0"/>
-              <a:t>16/11/2019</a:t>
+              <a:t>20/11/2019</a:t>
             </a:fld>
             <a:endParaRPr lang="fr-FR"/>
           </a:p>
@@ -2111,7 +2111,7 @@
           <a:p>
             <a:fld id="{C262451B-073C-4FAC-8D0B-6648421A7945}" type="datetimeFigureOut">
               <a:rPr lang="fr-FR" smtClean="0"/>
-              <a:t>16/11/2019</a:t>
+              <a:t>20/11/2019</a:t>
             </a:fld>
             <a:endParaRPr lang="fr-FR"/>
           </a:p>
@@ -2364,7 +2364,7 @@
           <a:p>
             <a:fld id="{C262451B-073C-4FAC-8D0B-6648421A7945}" type="datetimeFigureOut">
               <a:rPr lang="fr-FR" smtClean="0"/>
-              <a:t>16/11/2019</a:t>
+              <a:t>20/11/2019</a:t>
             </a:fld>
             <a:endParaRPr lang="fr-FR"/>
           </a:p>
@@ -2577,7 +2577,7 @@
           <a:p>
             <a:fld id="{C262451B-073C-4FAC-8D0B-6648421A7945}" type="datetimeFigureOut">
               <a:rPr lang="fr-FR" smtClean="0"/>
-              <a:t>16/11/2019</a:t>
+              <a:t>20/11/2019</a:t>
             </a:fld>
             <a:endParaRPr lang="fr-FR"/>
           </a:p>
@@ -3666,8 +3666,8 @@
           </a:prstGeom>
         </p:spPr>
       </p:pic>
-      <mc:AlternateContent xmlns:mc="http://schemas.openxmlformats.org/markup-compatibility/2006">
-        <mc:Choice xmlns:a14="http://schemas.microsoft.com/office/drawing/2010/main" Requires="a14">
+      <mc:AlternateContent xmlns:mc="http://schemas.openxmlformats.org/markup-compatibility/2006" xmlns:a14="http://schemas.microsoft.com/office/drawing/2010/main">
+        <mc:Choice Requires="a14">
           <p:sp>
             <p:nvSpPr>
               <p:cNvPr id="6" name="Rectangle 5"/>
@@ -3697,6 +3697,7 @@
               </a:bodyPr>
               <a:lstStyle/>
               <a:p>
+                <a:pPr/>
                 <a14:m>
                   <m:oMathPara xmlns:m="http://schemas.openxmlformats.org/officeDocument/2006/math">
                     <m:oMathParaPr>
@@ -3792,7 +3793,7 @@
             </p:txBody>
           </p:sp>
         </mc:Choice>
-        <mc:Fallback>
+        <mc:Fallback xmlns="">
           <p:sp>
             <p:nvSpPr>
               <p:cNvPr id="6" name="Rectangle 5"/>
@@ -3836,8 +3837,8 @@
           </p:sp>
         </mc:Fallback>
       </mc:AlternateContent>
-      <mc:AlternateContent xmlns:mc="http://schemas.openxmlformats.org/markup-compatibility/2006">
-        <mc:Choice xmlns:a14="http://schemas.microsoft.com/office/drawing/2010/main" Requires="a14">
+      <mc:AlternateContent xmlns:mc="http://schemas.openxmlformats.org/markup-compatibility/2006" xmlns:a14="http://schemas.microsoft.com/office/drawing/2010/main">
+        <mc:Choice Requires="a14">
           <p:sp>
             <p:nvSpPr>
               <p:cNvPr id="10" name="Rectangle 9"/>
@@ -3867,6 +3868,7 @@
               </a:bodyPr>
               <a:lstStyle/>
               <a:p>
+                <a:pPr/>
                 <a14:m>
                   <m:oMathPara xmlns:m="http://schemas.openxmlformats.org/officeDocument/2006/math">
                     <m:oMathParaPr>
@@ -3876,7 +3878,7 @@
                       <m:sSub>
                         <m:sSubPr>
                           <m:ctrlPr>
-                            <a:rPr lang="fr-FR" sz="2800" b="0" i="0" smtClean="0">
+                            <a:rPr lang="fr-FR" sz="2800" b="0" i="1" smtClean="0">
                               <a:solidFill>
                                 <a:schemeClr val="tx1"/>
                               </a:solidFill>
@@ -4000,7 +4002,7 @@
             </p:txBody>
           </p:sp>
         </mc:Choice>
-        <mc:Fallback>
+        <mc:Fallback xmlns="">
           <p:sp>
             <p:nvSpPr>
               <p:cNvPr id="10" name="Rectangle 9"/>
@@ -6217,7 +6219,7 @@
           <p:cNvPr id="10" name="Espace réservé du contenu 6">
             <a:extLst>
               <a:ext uri="{FF2B5EF4-FFF2-40B4-BE49-F238E27FC236}">
-                <a16:creationId xmlns="" xmlns:a16="http://schemas.microsoft.com/office/drawing/2014/main" xmlns:lc="http://schemas.openxmlformats.org/drawingml/2006/lockedCanvas" id="{EA58A18C-D1BC-42E4-A965-A2F39FEF10D0}"/>
+                <a16:creationId xmlns:lc="http://schemas.openxmlformats.org/drawingml/2006/lockedCanvas" xmlns:a16="http://schemas.microsoft.com/office/drawing/2014/main" xmlns="" id="{EA58A18C-D1BC-42E4-A965-A2F39FEF10D0}"/>
               </a:ext>
             </a:extLst>
           </p:cNvPr>
@@ -6409,7 +6411,7 @@
           <p:cNvPr id="6" name="Espace réservé du contenu 10">
             <a:extLst>
               <a:ext uri="{FF2B5EF4-FFF2-40B4-BE49-F238E27FC236}">
-                <a16:creationId xmlns="" xmlns:a16="http://schemas.microsoft.com/office/drawing/2014/main" xmlns:lc="http://schemas.openxmlformats.org/drawingml/2006/lockedCanvas" id="{E0E48B4E-62A3-413F-87E3-8793D40588D3}"/>
+                <a16:creationId xmlns:lc="http://schemas.openxmlformats.org/drawingml/2006/lockedCanvas" xmlns:a16="http://schemas.microsoft.com/office/drawing/2014/main" xmlns="" id="{E0E48B4E-62A3-413F-87E3-8793D40588D3}"/>
               </a:ext>
             </a:extLst>
           </p:cNvPr>
@@ -6755,7 +6757,7 @@
           <p:cNvPr id="7" name="Groupe 6">
             <a:extLst>
               <a:ext uri="{FF2B5EF4-FFF2-40B4-BE49-F238E27FC236}">
-                <a16:creationId xmlns:a16="http://schemas.microsoft.com/office/drawing/2014/main" xmlns="" id="{E922767D-63E0-49F8-8D0C-717AC65F818C}"/>
+                <a16:creationId xmlns="" xmlns:a16="http://schemas.microsoft.com/office/drawing/2014/main" id="{E922767D-63E0-49F8-8D0C-717AC65F818C}"/>
               </a:ext>
             </a:extLst>
           </p:cNvPr>
@@ -6775,7 +6777,7 @@
             <p:cNvPr id="8" name="Groupe 7">
               <a:extLst>
                 <a:ext uri="{FF2B5EF4-FFF2-40B4-BE49-F238E27FC236}">
-                  <a16:creationId xmlns:a16="http://schemas.microsoft.com/office/drawing/2014/main" xmlns="" id="{FFCD7857-F979-4EC2-BB38-BEA78E25BC9B}"/>
+                  <a16:creationId xmlns="" xmlns:a16="http://schemas.microsoft.com/office/drawing/2014/main" id="{FFCD7857-F979-4EC2-BB38-BEA78E25BC9B}"/>
                 </a:ext>
               </a:extLst>
             </p:cNvPr>
@@ -6795,7 +6797,7 @@
               <p:cNvPr id="11" name="Grouper 68">
                 <a:extLst>
                   <a:ext uri="{FF2B5EF4-FFF2-40B4-BE49-F238E27FC236}">
-                    <a16:creationId xmlns:a16="http://schemas.microsoft.com/office/drawing/2014/main" xmlns="" id="{40352CAA-B71B-4830-B4EA-649F52741662}"/>
+                    <a16:creationId xmlns="" xmlns:a16="http://schemas.microsoft.com/office/drawing/2014/main" id="{40352CAA-B71B-4830-B4EA-649F52741662}"/>
                   </a:ext>
                 </a:extLst>
               </p:cNvPr>
@@ -6815,7 +6817,7 @@
                 <p:cNvPr id="24" name="Grouper 69">
                   <a:extLst>
                     <a:ext uri="{FF2B5EF4-FFF2-40B4-BE49-F238E27FC236}">
-                      <a16:creationId xmlns:a16="http://schemas.microsoft.com/office/drawing/2014/main" xmlns="" id="{96081743-5FB9-4DAD-8C23-CA747114F3B8}"/>
+                      <a16:creationId xmlns="" xmlns:a16="http://schemas.microsoft.com/office/drawing/2014/main" id="{96081743-5FB9-4DAD-8C23-CA747114F3B8}"/>
                     </a:ext>
                   </a:extLst>
                 </p:cNvPr>
@@ -6831,7 +6833,7 @@
                 </a:xfrm>
                 <a:extLst>
                   <a:ext uri="{0CCBE362-F206-4b92-989A-16890622DB6E}">
-                    <ma14:wrappingTextBoxFlag xmlns:ma14="http://schemas.microsoft.com/office/mac/drawingml/2011/main" xmlns="" val="1"/>
+                    <ma14:wrappingTextBoxFlag xmlns="" xmlns:ma14="http://schemas.microsoft.com/office/mac/drawingml/2011/main" val="1"/>
                   </a:ext>
                 </a:extLst>
               </p:grpSpPr>
@@ -6840,7 +6842,7 @@
                   <p:cNvPr id="26" name="Grouper 71">
                     <a:extLst>
                       <a:ext uri="{FF2B5EF4-FFF2-40B4-BE49-F238E27FC236}">
-                        <a16:creationId xmlns:a16="http://schemas.microsoft.com/office/drawing/2014/main" xmlns="" id="{26D3EDCE-3D75-48BB-BCD5-7E23FCC76165}"/>
+                        <a16:creationId xmlns="" xmlns:a16="http://schemas.microsoft.com/office/drawing/2014/main" id="{26D3EDCE-3D75-48BB-BCD5-7E23FCC76165}"/>
                       </a:ext>
                     </a:extLst>
                   </p:cNvPr>
@@ -6860,7 +6862,7 @@
                     <p:cNvPr id="78" name="Grouper 123">
                       <a:extLst>
                         <a:ext uri="{FF2B5EF4-FFF2-40B4-BE49-F238E27FC236}">
-                          <a16:creationId xmlns:a16="http://schemas.microsoft.com/office/drawing/2014/main" xmlns="" id="{51F5C2B4-3BA6-474B-8106-53558EE4054A}"/>
+                          <a16:creationId xmlns="" xmlns:a16="http://schemas.microsoft.com/office/drawing/2014/main" id="{51F5C2B4-3BA6-474B-8106-53558EE4054A}"/>
                         </a:ext>
                       </a:extLst>
                     </p:cNvPr>
@@ -6880,7 +6882,7 @@
                       <p:cNvPr id="80" name="Grouper 125">
                         <a:extLst>
                           <a:ext uri="{FF2B5EF4-FFF2-40B4-BE49-F238E27FC236}">
-                            <a16:creationId xmlns:a16="http://schemas.microsoft.com/office/drawing/2014/main" xmlns="" id="{1209F394-A69E-424B-B28C-1CEA7BD5D8B1}"/>
+                            <a16:creationId xmlns="" xmlns:a16="http://schemas.microsoft.com/office/drawing/2014/main" id="{1209F394-A69E-424B-B28C-1CEA7BD5D8B1}"/>
                           </a:ext>
                         </a:extLst>
                       </p:cNvPr>
@@ -6900,7 +6902,7 @@
                         <p:cNvPr id="82" name="Arrondir un rectangle avec un coin du même côté 127">
                           <a:extLst>
                             <a:ext uri="{FF2B5EF4-FFF2-40B4-BE49-F238E27FC236}">
-                              <a16:creationId xmlns:a16="http://schemas.microsoft.com/office/drawing/2014/main" xmlns="" id="{9CC54105-DBD7-485D-919A-9D6E2E4634F9}"/>
+                              <a16:creationId xmlns="" xmlns:a16="http://schemas.microsoft.com/office/drawing/2014/main" id="{9CC54105-DBD7-485D-919A-9D6E2E4634F9}"/>
                             </a:ext>
                           </a:extLst>
                         </p:cNvPr>
@@ -6955,7 +6957,7 @@
                         <p:cNvPr id="83" name="Arrondir un rectangle avec un coin du même côté 128">
                           <a:extLst>
                             <a:ext uri="{FF2B5EF4-FFF2-40B4-BE49-F238E27FC236}">
-                              <a16:creationId xmlns:a16="http://schemas.microsoft.com/office/drawing/2014/main" xmlns="" id="{E8455875-8ED2-4FDE-A812-0DA55E45EBD3}"/>
+                              <a16:creationId xmlns="" xmlns:a16="http://schemas.microsoft.com/office/drawing/2014/main" id="{E8455875-8ED2-4FDE-A812-0DA55E45EBD3}"/>
                             </a:ext>
                           </a:extLst>
                         </p:cNvPr>
@@ -7011,7 +7013,7 @@
                       <p:cNvPr id="81" name="Rectangle 80">
                         <a:extLst>
                           <a:ext uri="{FF2B5EF4-FFF2-40B4-BE49-F238E27FC236}">
-                            <a16:creationId xmlns:a16="http://schemas.microsoft.com/office/drawing/2014/main" xmlns="" id="{D6B2A792-3C1D-410D-83CC-EE9AFA5BC57A}"/>
+                            <a16:creationId xmlns="" xmlns:a16="http://schemas.microsoft.com/office/drawing/2014/main" id="{D6B2A792-3C1D-410D-83CC-EE9AFA5BC57A}"/>
                           </a:ext>
                         </a:extLst>
                       </p:cNvPr>
@@ -7069,7 +7071,7 @@
                     <p:cNvPr id="79" name="Rectangle 78">
                       <a:extLst>
                         <a:ext uri="{FF2B5EF4-FFF2-40B4-BE49-F238E27FC236}">
-                          <a16:creationId xmlns:a16="http://schemas.microsoft.com/office/drawing/2014/main" xmlns="" id="{7C10C6FF-F8AC-4D17-BBC9-6D32B3AE86EA}"/>
+                          <a16:creationId xmlns="" xmlns:a16="http://schemas.microsoft.com/office/drawing/2014/main" id="{7C10C6FF-F8AC-4D17-BBC9-6D32B3AE86EA}"/>
                         </a:ext>
                       </a:extLst>
                     </p:cNvPr>
@@ -7127,7 +7129,7 @@
                   <p:cNvPr id="27" name="Grouper 72">
                     <a:extLst>
                       <a:ext uri="{FF2B5EF4-FFF2-40B4-BE49-F238E27FC236}">
-                        <a16:creationId xmlns:a16="http://schemas.microsoft.com/office/drawing/2014/main" xmlns="" id="{AA0FFDEF-FE93-4E25-9F69-1CD2B544BD9A}"/>
+                        <a16:creationId xmlns="" xmlns:a16="http://schemas.microsoft.com/office/drawing/2014/main" id="{AA0FFDEF-FE93-4E25-9F69-1CD2B544BD9A}"/>
                       </a:ext>
                     </a:extLst>
                   </p:cNvPr>
@@ -7147,7 +7149,7 @@
                     <p:cNvPr id="71" name="Arrondir un rectangle avec un coin du même côté 116">
                       <a:extLst>
                         <a:ext uri="{FF2B5EF4-FFF2-40B4-BE49-F238E27FC236}">
-                          <a16:creationId xmlns:a16="http://schemas.microsoft.com/office/drawing/2014/main" xmlns="" id="{DD037935-193F-457E-9A74-2D1C6015ED66}"/>
+                          <a16:creationId xmlns="" xmlns:a16="http://schemas.microsoft.com/office/drawing/2014/main" id="{DD037935-193F-457E-9A74-2D1C6015ED66}"/>
                         </a:ext>
                       </a:extLst>
                     </p:cNvPr>
@@ -7202,7 +7204,7 @@
                     <p:cNvPr id="72" name="Arrondir un rectangle avec un coin du même côté 117">
                       <a:extLst>
                         <a:ext uri="{FF2B5EF4-FFF2-40B4-BE49-F238E27FC236}">
-                          <a16:creationId xmlns:a16="http://schemas.microsoft.com/office/drawing/2014/main" xmlns="" id="{CE6B6CCB-93D9-40A9-B2B9-0F46261D492E}"/>
+                          <a16:creationId xmlns="" xmlns:a16="http://schemas.microsoft.com/office/drawing/2014/main" id="{CE6B6CCB-93D9-40A9-B2B9-0F46261D492E}"/>
                         </a:ext>
                       </a:extLst>
                     </p:cNvPr>
@@ -7257,7 +7259,7 @@
                     <p:cNvPr id="73" name="Rectangle 72">
                       <a:extLst>
                         <a:ext uri="{FF2B5EF4-FFF2-40B4-BE49-F238E27FC236}">
-                          <a16:creationId xmlns:a16="http://schemas.microsoft.com/office/drawing/2014/main" xmlns="" id="{F3B4FAE3-C823-49C7-981F-0F9C65BC226E}"/>
+                          <a16:creationId xmlns="" xmlns:a16="http://schemas.microsoft.com/office/drawing/2014/main" id="{F3B4FAE3-C823-49C7-981F-0F9C65BC226E}"/>
                         </a:ext>
                       </a:extLst>
                     </p:cNvPr>
@@ -7314,7 +7316,7 @@
                     <p:cNvPr id="74" name="Parallélogramme 73">
                       <a:extLst>
                         <a:ext uri="{FF2B5EF4-FFF2-40B4-BE49-F238E27FC236}">
-                          <a16:creationId xmlns:a16="http://schemas.microsoft.com/office/drawing/2014/main" xmlns="" id="{CCB23121-7617-4EA9-B289-2D44CC43E929}"/>
+                          <a16:creationId xmlns="" xmlns:a16="http://schemas.microsoft.com/office/drawing/2014/main" id="{CCB23121-7617-4EA9-B289-2D44CC43E929}"/>
                         </a:ext>
                       </a:extLst>
                     </p:cNvPr>
@@ -7375,7 +7377,7 @@
                     <p:cNvPr id="75" name="Parallélogramme 74">
                       <a:extLst>
                         <a:ext uri="{FF2B5EF4-FFF2-40B4-BE49-F238E27FC236}">
-                          <a16:creationId xmlns:a16="http://schemas.microsoft.com/office/drawing/2014/main" xmlns="" id="{CDD2A60A-E059-4565-A8E3-9D63509BFD7D}"/>
+                          <a16:creationId xmlns="" xmlns:a16="http://schemas.microsoft.com/office/drawing/2014/main" id="{CDD2A60A-E059-4565-A8E3-9D63509BFD7D}"/>
                         </a:ext>
                       </a:extLst>
                     </p:cNvPr>
@@ -7436,7 +7438,7 @@
                     <p:cNvPr id="76" name="Connecteur droit 75">
                       <a:extLst>
                         <a:ext uri="{FF2B5EF4-FFF2-40B4-BE49-F238E27FC236}">
-                          <a16:creationId xmlns:a16="http://schemas.microsoft.com/office/drawing/2014/main" xmlns="" id="{AF411BC3-A86B-4A5F-9DAF-9A687CA882ED}"/>
+                          <a16:creationId xmlns="" xmlns:a16="http://schemas.microsoft.com/office/drawing/2014/main" id="{AF411BC3-A86B-4A5F-9DAF-9A687CA882ED}"/>
                         </a:ext>
                       </a:extLst>
                     </p:cNvPr>
@@ -7474,7 +7476,7 @@
                     <p:cNvPr id="77" name="Connecteur droit 76">
                       <a:extLst>
                         <a:ext uri="{FF2B5EF4-FFF2-40B4-BE49-F238E27FC236}">
-                          <a16:creationId xmlns:a16="http://schemas.microsoft.com/office/drawing/2014/main" xmlns="" id="{841FF250-B55F-4D70-BF44-D2DD43333DF4}"/>
+                          <a16:creationId xmlns="" xmlns:a16="http://schemas.microsoft.com/office/drawing/2014/main" id="{841FF250-B55F-4D70-BF44-D2DD43333DF4}"/>
                         </a:ext>
                       </a:extLst>
                     </p:cNvPr>
@@ -7513,7 +7515,7 @@
                   <p:cNvPr id="28" name="Grouper 73">
                     <a:extLst>
                       <a:ext uri="{FF2B5EF4-FFF2-40B4-BE49-F238E27FC236}">
-                        <a16:creationId xmlns:a16="http://schemas.microsoft.com/office/drawing/2014/main" xmlns="" id="{7E0F2A28-B6AC-4B1A-9BE8-2703C34063FF}"/>
+                        <a16:creationId xmlns="" xmlns:a16="http://schemas.microsoft.com/office/drawing/2014/main" id="{7E0F2A28-B6AC-4B1A-9BE8-2703C34063FF}"/>
                       </a:ext>
                     </a:extLst>
                   </p:cNvPr>
@@ -7533,7 +7535,7 @@
                     <p:cNvPr id="69" name="Rectangle 68">
                       <a:extLst>
                         <a:ext uri="{FF2B5EF4-FFF2-40B4-BE49-F238E27FC236}">
-                          <a16:creationId xmlns:a16="http://schemas.microsoft.com/office/drawing/2014/main" xmlns="" id="{FA13F0A6-14B0-4342-B4A3-B9CC0481E5D8}"/>
+                          <a16:creationId xmlns="" xmlns:a16="http://schemas.microsoft.com/office/drawing/2014/main" id="{FA13F0A6-14B0-4342-B4A3-B9CC0481E5D8}"/>
                         </a:ext>
                       </a:extLst>
                     </p:cNvPr>
@@ -7590,7 +7592,7 @@
                     <p:cNvPr id="70" name="Ellipse 69">
                       <a:extLst>
                         <a:ext uri="{FF2B5EF4-FFF2-40B4-BE49-F238E27FC236}">
-                          <a16:creationId xmlns:a16="http://schemas.microsoft.com/office/drawing/2014/main" xmlns="" id="{4DB04C9A-91AD-4490-86DD-2F28CC511EB6}"/>
+                          <a16:creationId xmlns="" xmlns:a16="http://schemas.microsoft.com/office/drawing/2014/main" id="{4DB04C9A-91AD-4490-86DD-2F28CC511EB6}"/>
                         </a:ext>
                       </a:extLst>
                     </p:cNvPr>
@@ -7654,7 +7656,7 @@
                   <p:cNvPr id="29" name="Grouper 74">
                     <a:extLst>
                       <a:ext uri="{FF2B5EF4-FFF2-40B4-BE49-F238E27FC236}">
-                        <a16:creationId xmlns:a16="http://schemas.microsoft.com/office/drawing/2014/main" xmlns="" id="{F0965761-2E00-451E-BDCE-F9D0E5B81296}"/>
+                        <a16:creationId xmlns="" xmlns:a16="http://schemas.microsoft.com/office/drawing/2014/main" id="{F0965761-2E00-451E-BDCE-F9D0E5B81296}"/>
                       </a:ext>
                     </a:extLst>
                   </p:cNvPr>
@@ -7674,7 +7676,7 @@
                     <p:cNvPr id="56" name="Grouper 101">
                       <a:extLst>
                         <a:ext uri="{FF2B5EF4-FFF2-40B4-BE49-F238E27FC236}">
-                          <a16:creationId xmlns:a16="http://schemas.microsoft.com/office/drawing/2014/main" xmlns="" id="{F9EC72F1-04D7-42DD-8621-F5DECD18A5F5}"/>
+                          <a16:creationId xmlns="" xmlns:a16="http://schemas.microsoft.com/office/drawing/2014/main" id="{F9EC72F1-04D7-42DD-8621-F5DECD18A5F5}"/>
                         </a:ext>
                       </a:extLst>
                     </p:cNvPr>
@@ -7694,7 +7696,7 @@
                       <p:cNvPr id="65" name="Ellipse 64">
                         <a:extLst>
                           <a:ext uri="{FF2B5EF4-FFF2-40B4-BE49-F238E27FC236}">
-                            <a16:creationId xmlns:a16="http://schemas.microsoft.com/office/drawing/2014/main" xmlns="" id="{4DD5C452-7FFE-452B-9491-34AE14CF28A1}"/>
+                            <a16:creationId xmlns="" xmlns:a16="http://schemas.microsoft.com/office/drawing/2014/main" id="{4DD5C452-7FFE-452B-9491-34AE14CF28A1}"/>
                           </a:ext>
                         </a:extLst>
                       </p:cNvPr>
@@ -7749,7 +7751,7 @@
                       <p:cNvPr id="66" name="Zone de texte 941">
                         <a:extLst>
                           <a:ext uri="{FF2B5EF4-FFF2-40B4-BE49-F238E27FC236}">
-                            <a16:creationId xmlns:a16="http://schemas.microsoft.com/office/drawing/2014/main" xmlns="" id="{EDE1631E-2625-49E1-AC75-A37414A156AF}"/>
+                            <a16:creationId xmlns="" xmlns:a16="http://schemas.microsoft.com/office/drawing/2014/main" id="{EDE1631E-2625-49E1-AC75-A37414A156AF}"/>
                           </a:ext>
                         </a:extLst>
                       </p:cNvPr>
@@ -7771,7 +7773,7 @@
                       <a:effectLst/>
                       <a:extLst>
                         <a:ext uri="{C572A759-6A51-4108-AA02-DFA0A04FC94B}">
-                          <ma14:wrappingTextBoxFlag xmlns:ma14="http://schemas.microsoft.com/office/mac/drawingml/2011/main" xmlns="" val="1"/>
+                          <ma14:wrappingTextBoxFlag xmlns="" xmlns:ma14="http://schemas.microsoft.com/office/mac/drawingml/2011/main" val="1"/>
                         </a:ext>
                       </a:extLst>
                     </p:spPr>
@@ -7835,7 +7837,7 @@
                       <p:cNvPr id="67" name="Zone de texte 942">
                         <a:extLst>
                           <a:ext uri="{FF2B5EF4-FFF2-40B4-BE49-F238E27FC236}">
-                            <a16:creationId xmlns:a16="http://schemas.microsoft.com/office/drawing/2014/main" xmlns="" id="{751399F5-7817-408F-887F-80309B0DEBC2}"/>
+                            <a16:creationId xmlns="" xmlns:a16="http://schemas.microsoft.com/office/drawing/2014/main" id="{751399F5-7817-408F-887F-80309B0DEBC2}"/>
                           </a:ext>
                         </a:extLst>
                       </p:cNvPr>
@@ -7857,7 +7859,7 @@
                       <a:effectLst/>
                       <a:extLst>
                         <a:ext uri="{C572A759-6A51-4108-AA02-DFA0A04FC94B}">
-                          <ma14:wrappingTextBoxFlag xmlns:ma14="http://schemas.microsoft.com/office/mac/drawingml/2011/main" xmlns="" val="1"/>
+                          <ma14:wrappingTextBoxFlag xmlns="" xmlns:ma14="http://schemas.microsoft.com/office/mac/drawingml/2011/main" val="1"/>
                         </a:ext>
                       </a:extLst>
                     </p:spPr>
@@ -7921,7 +7923,7 @@
                       <p:cNvPr id="68" name="Zone de texte 900">
                         <a:extLst>
                           <a:ext uri="{FF2B5EF4-FFF2-40B4-BE49-F238E27FC236}">
-                            <a16:creationId xmlns:a16="http://schemas.microsoft.com/office/drawing/2014/main" xmlns="" id="{5B87DF95-433A-493D-9AD7-C56AA5757C8B}"/>
+                            <a16:creationId xmlns="" xmlns:a16="http://schemas.microsoft.com/office/drawing/2014/main" id="{5B87DF95-433A-493D-9AD7-C56AA5757C8B}"/>
                           </a:ext>
                         </a:extLst>
                       </p:cNvPr>
@@ -7943,7 +7945,7 @@
                       <a:effectLst/>
                       <a:extLst>
                         <a:ext uri="{C572A759-6A51-4108-AA02-DFA0A04FC94B}">
-                          <ma14:wrappingTextBoxFlag xmlns:ma14="http://schemas.microsoft.com/office/mac/drawingml/2011/main" xmlns="" val="1"/>
+                          <ma14:wrappingTextBoxFlag xmlns="" xmlns:ma14="http://schemas.microsoft.com/office/mac/drawingml/2011/main" val="1"/>
                         </a:ext>
                       </a:extLst>
                     </p:spPr>
@@ -7997,7 +7999,7 @@
                     <p:cNvPr id="57" name="Grouper 102">
                       <a:extLst>
                         <a:ext uri="{FF2B5EF4-FFF2-40B4-BE49-F238E27FC236}">
-                          <a16:creationId xmlns:a16="http://schemas.microsoft.com/office/drawing/2014/main" xmlns="" id="{CD10D8B0-3F3A-428B-ADFB-7CD43137C732}"/>
+                          <a16:creationId xmlns="" xmlns:a16="http://schemas.microsoft.com/office/drawing/2014/main" id="{CD10D8B0-3F3A-428B-ADFB-7CD43137C732}"/>
                         </a:ext>
                       </a:extLst>
                     </p:cNvPr>
@@ -8017,7 +8019,7 @@
                       <p:cNvPr id="62" name="Connecteur droit 61">
                         <a:extLst>
                           <a:ext uri="{FF2B5EF4-FFF2-40B4-BE49-F238E27FC236}">
-                            <a16:creationId xmlns:a16="http://schemas.microsoft.com/office/drawing/2014/main" xmlns="" id="{6CED5B28-251A-4695-9AC4-75ABE8322B80}"/>
+                            <a16:creationId xmlns="" xmlns:a16="http://schemas.microsoft.com/office/drawing/2014/main" id="{6CED5B28-251A-4695-9AC4-75ABE8322B80}"/>
                           </a:ext>
                         </a:extLst>
                       </p:cNvPr>
@@ -8059,7 +8061,7 @@
                       <p:cNvPr id="63" name="Connecteur droit 62">
                         <a:extLst>
                           <a:ext uri="{FF2B5EF4-FFF2-40B4-BE49-F238E27FC236}">
-                            <a16:creationId xmlns:a16="http://schemas.microsoft.com/office/drawing/2014/main" xmlns="" id="{AB459293-BB0A-4D9C-A290-FC7447FE24C8}"/>
+                            <a16:creationId xmlns="" xmlns:a16="http://schemas.microsoft.com/office/drawing/2014/main" id="{AB459293-BB0A-4D9C-A290-FC7447FE24C8}"/>
                           </a:ext>
                         </a:extLst>
                       </p:cNvPr>
@@ -8101,7 +8103,7 @@
                       <p:cNvPr id="64" name="Connecteur droit 63">
                         <a:extLst>
                           <a:ext uri="{FF2B5EF4-FFF2-40B4-BE49-F238E27FC236}">
-                            <a16:creationId xmlns:a16="http://schemas.microsoft.com/office/drawing/2014/main" xmlns="" id="{4BF11C18-05F0-4FDB-AE77-4D013016F528}"/>
+                            <a16:creationId xmlns="" xmlns:a16="http://schemas.microsoft.com/office/drawing/2014/main" id="{4BF11C18-05F0-4FDB-AE77-4D013016F528}"/>
                           </a:ext>
                         </a:extLst>
                       </p:cNvPr>
@@ -8144,7 +8146,7 @@
                     <p:cNvPr id="58" name="Grouper 103">
                       <a:extLst>
                         <a:ext uri="{FF2B5EF4-FFF2-40B4-BE49-F238E27FC236}">
-                          <a16:creationId xmlns:a16="http://schemas.microsoft.com/office/drawing/2014/main" xmlns="" id="{2D2B29B8-AE04-4246-8062-EFF0E8D66284}"/>
+                          <a16:creationId xmlns="" xmlns:a16="http://schemas.microsoft.com/office/drawing/2014/main" id="{2D2B29B8-AE04-4246-8062-EFF0E8D66284}"/>
                         </a:ext>
                       </a:extLst>
                     </p:cNvPr>
@@ -8164,7 +8166,7 @@
                       <p:cNvPr id="59" name="Connecteur droit 58">
                         <a:extLst>
                           <a:ext uri="{FF2B5EF4-FFF2-40B4-BE49-F238E27FC236}">
-                            <a16:creationId xmlns:a16="http://schemas.microsoft.com/office/drawing/2014/main" xmlns="" id="{E8789211-76BC-4FBE-BE96-041CB645CE63}"/>
+                            <a16:creationId xmlns="" xmlns:a16="http://schemas.microsoft.com/office/drawing/2014/main" id="{E8789211-76BC-4FBE-BE96-041CB645CE63}"/>
                           </a:ext>
                         </a:extLst>
                       </p:cNvPr>
@@ -8206,7 +8208,7 @@
                       <p:cNvPr id="60" name="Connecteur droit 59">
                         <a:extLst>
                           <a:ext uri="{FF2B5EF4-FFF2-40B4-BE49-F238E27FC236}">
-                            <a16:creationId xmlns:a16="http://schemas.microsoft.com/office/drawing/2014/main" xmlns="" id="{63CD0D8C-676C-481E-B9A5-F97E8CAD6156}"/>
+                            <a16:creationId xmlns="" xmlns:a16="http://schemas.microsoft.com/office/drawing/2014/main" id="{63CD0D8C-676C-481E-B9A5-F97E8CAD6156}"/>
                           </a:ext>
                         </a:extLst>
                       </p:cNvPr>
@@ -8248,7 +8250,7 @@
                       <p:cNvPr id="61" name="Connecteur droit 60">
                         <a:extLst>
                           <a:ext uri="{FF2B5EF4-FFF2-40B4-BE49-F238E27FC236}">
-                            <a16:creationId xmlns:a16="http://schemas.microsoft.com/office/drawing/2014/main" xmlns="" id="{F7E8CC27-81C6-4C78-8D6B-BC5E2B57CF76}"/>
+                            <a16:creationId xmlns="" xmlns:a16="http://schemas.microsoft.com/office/drawing/2014/main" id="{F7E8CC27-81C6-4C78-8D6B-BC5E2B57CF76}"/>
                           </a:ext>
                         </a:extLst>
                       </p:cNvPr>
@@ -8292,7 +8294,7 @@
                   <p:cNvPr id="30" name="Grouper 75">
                     <a:extLst>
                       <a:ext uri="{FF2B5EF4-FFF2-40B4-BE49-F238E27FC236}">
-                        <a16:creationId xmlns:a16="http://schemas.microsoft.com/office/drawing/2014/main" xmlns="" id="{D5E24073-AF22-4C5B-AC88-760F8428CAAD}"/>
+                        <a16:creationId xmlns="" xmlns:a16="http://schemas.microsoft.com/office/drawing/2014/main" id="{D5E24073-AF22-4C5B-AC88-760F8428CAAD}"/>
                       </a:ext>
                     </a:extLst>
                   </p:cNvPr>
@@ -8312,7 +8314,7 @@
                     <p:cNvPr id="44" name="Grouper 89">
                       <a:extLst>
                         <a:ext uri="{FF2B5EF4-FFF2-40B4-BE49-F238E27FC236}">
-                          <a16:creationId xmlns:a16="http://schemas.microsoft.com/office/drawing/2014/main" xmlns="" id="{1ED1AEE1-B7CF-4F0E-9454-7B87B28C2BB6}"/>
+                          <a16:creationId xmlns="" xmlns:a16="http://schemas.microsoft.com/office/drawing/2014/main" id="{1ED1AEE1-B7CF-4F0E-9454-7B87B28C2BB6}"/>
                         </a:ext>
                       </a:extLst>
                     </p:cNvPr>
@@ -8332,7 +8334,7 @@
                       <p:cNvPr id="54" name="Connecteur droit 53">
                         <a:extLst>
                           <a:ext uri="{FF2B5EF4-FFF2-40B4-BE49-F238E27FC236}">
-                            <a16:creationId xmlns:a16="http://schemas.microsoft.com/office/drawing/2014/main" xmlns="" id="{52DB56DC-F90B-45D1-B22E-CAE16CF14DD3}"/>
+                            <a16:creationId xmlns="" xmlns:a16="http://schemas.microsoft.com/office/drawing/2014/main" id="{52DB56DC-F90B-45D1-B22E-CAE16CF14DD3}"/>
                           </a:ext>
                         </a:extLst>
                       </p:cNvPr>
@@ -8374,7 +8376,7 @@
                       <p:cNvPr id="55" name="Connecteur droit 54">
                         <a:extLst>
                           <a:ext uri="{FF2B5EF4-FFF2-40B4-BE49-F238E27FC236}">
-                            <a16:creationId xmlns:a16="http://schemas.microsoft.com/office/drawing/2014/main" xmlns="" id="{CD4FCA04-C73F-403C-9F6E-DD1754BA8E1C}"/>
+                            <a16:creationId xmlns="" xmlns:a16="http://schemas.microsoft.com/office/drawing/2014/main" id="{CD4FCA04-C73F-403C-9F6E-DD1754BA8E1C}"/>
                           </a:ext>
                         </a:extLst>
                       </p:cNvPr>
@@ -8417,7 +8419,7 @@
                     <p:cNvPr id="45" name="Grouper 90">
                       <a:extLst>
                         <a:ext uri="{FF2B5EF4-FFF2-40B4-BE49-F238E27FC236}">
-                          <a16:creationId xmlns:a16="http://schemas.microsoft.com/office/drawing/2014/main" xmlns="" id="{263D8CAB-9A0C-4705-AB09-C58128092079}"/>
+                          <a16:creationId xmlns="" xmlns:a16="http://schemas.microsoft.com/office/drawing/2014/main" id="{263D8CAB-9A0C-4705-AB09-C58128092079}"/>
                         </a:ext>
                       </a:extLst>
                     </p:cNvPr>
@@ -8437,7 +8439,7 @@
                       <p:cNvPr id="52" name="Connecteur droit 51">
                         <a:extLst>
                           <a:ext uri="{FF2B5EF4-FFF2-40B4-BE49-F238E27FC236}">
-                            <a16:creationId xmlns:a16="http://schemas.microsoft.com/office/drawing/2014/main" xmlns="" id="{D312452A-8444-4E4F-97E0-069D38E44D32}"/>
+                            <a16:creationId xmlns="" xmlns:a16="http://schemas.microsoft.com/office/drawing/2014/main" id="{D312452A-8444-4E4F-97E0-069D38E44D32}"/>
                           </a:ext>
                         </a:extLst>
                       </p:cNvPr>
@@ -8479,7 +8481,7 @@
                       <p:cNvPr id="53" name="Connecteur droit 52">
                         <a:extLst>
                           <a:ext uri="{FF2B5EF4-FFF2-40B4-BE49-F238E27FC236}">
-                            <a16:creationId xmlns:a16="http://schemas.microsoft.com/office/drawing/2014/main" xmlns="" id="{03279640-78F8-45D4-95D1-3764663213E0}"/>
+                            <a16:creationId xmlns="" xmlns:a16="http://schemas.microsoft.com/office/drawing/2014/main" id="{03279640-78F8-45D4-95D1-3764663213E0}"/>
                           </a:ext>
                         </a:extLst>
                       </p:cNvPr>
@@ -8522,7 +8524,7 @@
                     <p:cNvPr id="46" name="Grouper 91">
                       <a:extLst>
                         <a:ext uri="{FF2B5EF4-FFF2-40B4-BE49-F238E27FC236}">
-                          <a16:creationId xmlns:a16="http://schemas.microsoft.com/office/drawing/2014/main" xmlns="" id="{150A1D0A-A1C0-4009-86A9-EFC3111990BE}"/>
+                          <a16:creationId xmlns="" xmlns:a16="http://schemas.microsoft.com/office/drawing/2014/main" id="{150A1D0A-A1C0-4009-86A9-EFC3111990BE}"/>
                         </a:ext>
                       </a:extLst>
                     </p:cNvPr>
@@ -8542,7 +8544,7 @@
                       <p:cNvPr id="50" name="Connecteur droit 49">
                         <a:extLst>
                           <a:ext uri="{FF2B5EF4-FFF2-40B4-BE49-F238E27FC236}">
-                            <a16:creationId xmlns:a16="http://schemas.microsoft.com/office/drawing/2014/main" xmlns="" id="{7CFA150A-4557-4613-92EF-76CEC0F96008}"/>
+                            <a16:creationId xmlns="" xmlns:a16="http://schemas.microsoft.com/office/drawing/2014/main" id="{7CFA150A-4557-4613-92EF-76CEC0F96008}"/>
                           </a:ext>
                         </a:extLst>
                       </p:cNvPr>
@@ -8584,7 +8586,7 @@
                       <p:cNvPr id="51" name="Connecteur droit 50">
                         <a:extLst>
                           <a:ext uri="{FF2B5EF4-FFF2-40B4-BE49-F238E27FC236}">
-                            <a16:creationId xmlns:a16="http://schemas.microsoft.com/office/drawing/2014/main" xmlns="" id="{A8CB4CBF-10D5-4875-89BD-C50B9FC4F172}"/>
+                            <a16:creationId xmlns="" xmlns:a16="http://schemas.microsoft.com/office/drawing/2014/main" id="{A8CB4CBF-10D5-4875-89BD-C50B9FC4F172}"/>
                           </a:ext>
                         </a:extLst>
                       </p:cNvPr>
@@ -8627,7 +8629,7 @@
                     <p:cNvPr id="47" name="Grouper 92">
                       <a:extLst>
                         <a:ext uri="{FF2B5EF4-FFF2-40B4-BE49-F238E27FC236}">
-                          <a16:creationId xmlns:a16="http://schemas.microsoft.com/office/drawing/2014/main" xmlns="" id="{940CB44A-AA17-4F31-80D5-E996884FF4F2}"/>
+                          <a16:creationId xmlns="" xmlns:a16="http://schemas.microsoft.com/office/drawing/2014/main" id="{940CB44A-AA17-4F31-80D5-E996884FF4F2}"/>
                         </a:ext>
                       </a:extLst>
                     </p:cNvPr>
@@ -8647,7 +8649,7 @@
                       <p:cNvPr id="48" name="Connecteur droit 47">
                         <a:extLst>
                           <a:ext uri="{FF2B5EF4-FFF2-40B4-BE49-F238E27FC236}">
-                            <a16:creationId xmlns:a16="http://schemas.microsoft.com/office/drawing/2014/main" xmlns="" id="{F54EAE8D-B716-4952-A52C-A45018C6970D}"/>
+                            <a16:creationId xmlns="" xmlns:a16="http://schemas.microsoft.com/office/drawing/2014/main" id="{F54EAE8D-B716-4952-A52C-A45018C6970D}"/>
                           </a:ext>
                         </a:extLst>
                       </p:cNvPr>
@@ -8689,7 +8691,7 @@
                       <p:cNvPr id="49" name="Connecteur droit 48">
                         <a:extLst>
                           <a:ext uri="{FF2B5EF4-FFF2-40B4-BE49-F238E27FC236}">
-                            <a16:creationId xmlns:a16="http://schemas.microsoft.com/office/drawing/2014/main" xmlns="" id="{3E406D1E-88FB-4E78-BBBE-8976DB2A926D}"/>
+                            <a16:creationId xmlns="" xmlns:a16="http://schemas.microsoft.com/office/drawing/2014/main" id="{3E406D1E-88FB-4E78-BBBE-8976DB2A926D}"/>
                           </a:ext>
                         </a:extLst>
                       </p:cNvPr>
@@ -8733,7 +8735,7 @@
                   <p:cNvPr id="31" name="Grouper 76">
                     <a:extLst>
                       <a:ext uri="{FF2B5EF4-FFF2-40B4-BE49-F238E27FC236}">
-                        <a16:creationId xmlns:a16="http://schemas.microsoft.com/office/drawing/2014/main" xmlns="" id="{4D53651E-F881-40BB-9801-2D3A6DF799B1}"/>
+                        <a16:creationId xmlns="" xmlns:a16="http://schemas.microsoft.com/office/drawing/2014/main" id="{4D53651E-F881-40BB-9801-2D3A6DF799B1}"/>
                       </a:ext>
                     </a:extLst>
                   </p:cNvPr>
@@ -8753,7 +8755,7 @@
                     <p:cNvPr id="32" name="Grouper 77">
                       <a:extLst>
                         <a:ext uri="{FF2B5EF4-FFF2-40B4-BE49-F238E27FC236}">
-                          <a16:creationId xmlns:a16="http://schemas.microsoft.com/office/drawing/2014/main" xmlns="" id="{01DE92F4-9AD9-43CF-BAB2-952257B0D0CD}"/>
+                          <a16:creationId xmlns="" xmlns:a16="http://schemas.microsoft.com/office/drawing/2014/main" id="{01DE92F4-9AD9-43CF-BAB2-952257B0D0CD}"/>
                         </a:ext>
                       </a:extLst>
                     </p:cNvPr>
@@ -8773,7 +8775,7 @@
                       <p:cNvPr id="42" name="Connecteur droit 41">
                         <a:extLst>
                           <a:ext uri="{FF2B5EF4-FFF2-40B4-BE49-F238E27FC236}">
-                            <a16:creationId xmlns:a16="http://schemas.microsoft.com/office/drawing/2014/main" xmlns="" id="{02A2D758-AF88-43F2-9D90-C06EB07E6113}"/>
+                            <a16:creationId xmlns="" xmlns:a16="http://schemas.microsoft.com/office/drawing/2014/main" id="{02A2D758-AF88-43F2-9D90-C06EB07E6113}"/>
                           </a:ext>
                         </a:extLst>
                       </p:cNvPr>
@@ -8815,7 +8817,7 @@
                       <p:cNvPr id="43" name="Connecteur droit 42">
                         <a:extLst>
                           <a:ext uri="{FF2B5EF4-FFF2-40B4-BE49-F238E27FC236}">
-                            <a16:creationId xmlns:a16="http://schemas.microsoft.com/office/drawing/2014/main" xmlns="" id="{7EFB4E84-7B79-441F-8972-96211A1EFB13}"/>
+                            <a16:creationId xmlns="" xmlns:a16="http://schemas.microsoft.com/office/drawing/2014/main" id="{7EFB4E84-7B79-441F-8972-96211A1EFB13}"/>
                           </a:ext>
                         </a:extLst>
                       </p:cNvPr>
@@ -8858,7 +8860,7 @@
                     <p:cNvPr id="33" name="Grouper 78">
                       <a:extLst>
                         <a:ext uri="{FF2B5EF4-FFF2-40B4-BE49-F238E27FC236}">
-                          <a16:creationId xmlns:a16="http://schemas.microsoft.com/office/drawing/2014/main" xmlns="" id="{A7B59A61-9DBD-4011-809E-FDED1C558C01}"/>
+                          <a16:creationId xmlns="" xmlns:a16="http://schemas.microsoft.com/office/drawing/2014/main" id="{A7B59A61-9DBD-4011-809E-FDED1C558C01}"/>
                         </a:ext>
                       </a:extLst>
                     </p:cNvPr>
@@ -8878,7 +8880,7 @@
                       <p:cNvPr id="40" name="Connecteur droit 39">
                         <a:extLst>
                           <a:ext uri="{FF2B5EF4-FFF2-40B4-BE49-F238E27FC236}">
-                            <a16:creationId xmlns:a16="http://schemas.microsoft.com/office/drawing/2014/main" xmlns="" id="{F385CD89-8FA2-4B91-BC38-57972661F58B}"/>
+                            <a16:creationId xmlns="" xmlns:a16="http://schemas.microsoft.com/office/drawing/2014/main" id="{F385CD89-8FA2-4B91-BC38-57972661F58B}"/>
                           </a:ext>
                         </a:extLst>
                       </p:cNvPr>
@@ -8920,7 +8922,7 @@
                       <p:cNvPr id="41" name="Connecteur droit 40">
                         <a:extLst>
                           <a:ext uri="{FF2B5EF4-FFF2-40B4-BE49-F238E27FC236}">
-                            <a16:creationId xmlns:a16="http://schemas.microsoft.com/office/drawing/2014/main" xmlns="" id="{662E7E78-CBC5-4133-B9C4-5CA29E4D1B4F}"/>
+                            <a16:creationId xmlns="" xmlns:a16="http://schemas.microsoft.com/office/drawing/2014/main" id="{662E7E78-CBC5-4133-B9C4-5CA29E4D1B4F}"/>
                           </a:ext>
                         </a:extLst>
                       </p:cNvPr>
@@ -8963,7 +8965,7 @@
                     <p:cNvPr id="34" name="Grouper 79">
                       <a:extLst>
                         <a:ext uri="{FF2B5EF4-FFF2-40B4-BE49-F238E27FC236}">
-                          <a16:creationId xmlns:a16="http://schemas.microsoft.com/office/drawing/2014/main" xmlns="" id="{5D6FA5B0-581C-4DC2-B4B6-ACBD65D647AA}"/>
+                          <a16:creationId xmlns="" xmlns:a16="http://schemas.microsoft.com/office/drawing/2014/main" id="{5D6FA5B0-581C-4DC2-B4B6-ACBD65D647AA}"/>
                         </a:ext>
                       </a:extLst>
                     </p:cNvPr>
@@ -8983,7 +8985,7 @@
                       <p:cNvPr id="38" name="Connecteur droit 37">
                         <a:extLst>
                           <a:ext uri="{FF2B5EF4-FFF2-40B4-BE49-F238E27FC236}">
-                            <a16:creationId xmlns:a16="http://schemas.microsoft.com/office/drawing/2014/main" xmlns="" id="{972D0AE5-13BA-49AA-9B74-8C3C8E0F77E9}"/>
+                            <a16:creationId xmlns="" xmlns:a16="http://schemas.microsoft.com/office/drawing/2014/main" id="{972D0AE5-13BA-49AA-9B74-8C3C8E0F77E9}"/>
                           </a:ext>
                         </a:extLst>
                       </p:cNvPr>
@@ -9025,7 +9027,7 @@
                       <p:cNvPr id="39" name="Connecteur droit 38">
                         <a:extLst>
                           <a:ext uri="{FF2B5EF4-FFF2-40B4-BE49-F238E27FC236}">
-                            <a16:creationId xmlns:a16="http://schemas.microsoft.com/office/drawing/2014/main" xmlns="" id="{68363E9F-295B-464E-8180-7E7109DE2E98}"/>
+                            <a16:creationId xmlns="" xmlns:a16="http://schemas.microsoft.com/office/drawing/2014/main" id="{68363E9F-295B-464E-8180-7E7109DE2E98}"/>
                           </a:ext>
                         </a:extLst>
                       </p:cNvPr>
@@ -9068,7 +9070,7 @@
                     <p:cNvPr id="35" name="Grouper 80">
                       <a:extLst>
                         <a:ext uri="{FF2B5EF4-FFF2-40B4-BE49-F238E27FC236}">
-                          <a16:creationId xmlns:a16="http://schemas.microsoft.com/office/drawing/2014/main" xmlns="" id="{A94BFBEB-D11E-482C-9FA8-E6329D929B9B}"/>
+                          <a16:creationId xmlns="" xmlns:a16="http://schemas.microsoft.com/office/drawing/2014/main" id="{A94BFBEB-D11E-482C-9FA8-E6329D929B9B}"/>
                         </a:ext>
                       </a:extLst>
                     </p:cNvPr>
@@ -9088,7 +9090,7 @@
                       <p:cNvPr id="36" name="Connecteur droit 35">
                         <a:extLst>
                           <a:ext uri="{FF2B5EF4-FFF2-40B4-BE49-F238E27FC236}">
-                            <a16:creationId xmlns:a16="http://schemas.microsoft.com/office/drawing/2014/main" xmlns="" id="{5683A197-B24F-409A-8B02-4CBCF86D4689}"/>
+                            <a16:creationId xmlns="" xmlns:a16="http://schemas.microsoft.com/office/drawing/2014/main" id="{5683A197-B24F-409A-8B02-4CBCF86D4689}"/>
                           </a:ext>
                         </a:extLst>
                       </p:cNvPr>
@@ -9130,7 +9132,7 @@
                       <p:cNvPr id="37" name="Connecteur droit 36">
                         <a:extLst>
                           <a:ext uri="{FF2B5EF4-FFF2-40B4-BE49-F238E27FC236}">
-                            <a16:creationId xmlns:a16="http://schemas.microsoft.com/office/drawing/2014/main" xmlns="" id="{B47D596A-4924-4DF5-90D6-0FEF52062A5D}"/>
+                            <a16:creationId xmlns="" xmlns:a16="http://schemas.microsoft.com/office/drawing/2014/main" id="{B47D596A-4924-4DF5-90D6-0FEF52062A5D}"/>
                           </a:ext>
                         </a:extLst>
                       </p:cNvPr>
@@ -9175,7 +9177,7 @@
                 <p:cNvPr id="25" name="Rectangle à coins arrondis 70">
                   <a:extLst>
                     <a:ext uri="{FF2B5EF4-FFF2-40B4-BE49-F238E27FC236}">
-                      <a16:creationId xmlns:a16="http://schemas.microsoft.com/office/drawing/2014/main" xmlns="" id="{5BFDB0C9-FA7C-4B5A-8E70-355D0CEA4EAF}"/>
+                      <a16:creationId xmlns="" xmlns:a16="http://schemas.microsoft.com/office/drawing/2014/main" id="{5BFDB0C9-FA7C-4B5A-8E70-355D0CEA4EAF}"/>
                     </a:ext>
                   </a:extLst>
                 </p:cNvPr>
@@ -9233,7 +9235,7 @@
               <p:cNvPr id="12" name="ZoneTexte 11">
                 <a:extLst>
                   <a:ext uri="{FF2B5EF4-FFF2-40B4-BE49-F238E27FC236}">
-                    <a16:creationId xmlns:a16="http://schemas.microsoft.com/office/drawing/2014/main" xmlns="" id="{2D3CA78A-133B-4B7E-95D7-277085679B66}"/>
+                    <a16:creationId xmlns="" xmlns:a16="http://schemas.microsoft.com/office/drawing/2014/main" id="{2D3CA78A-133B-4B7E-95D7-277085679B66}"/>
                   </a:ext>
                 </a:extLst>
               </p:cNvPr>
@@ -9275,7 +9277,7 @@
               <p:cNvPr id="13" name="ZoneTexte 12">
                 <a:extLst>
                   <a:ext uri="{FF2B5EF4-FFF2-40B4-BE49-F238E27FC236}">
-                    <a16:creationId xmlns:a16="http://schemas.microsoft.com/office/drawing/2014/main" xmlns="" id="{E4100E4F-C25C-43F5-900D-2CF6DFF0AA7A}"/>
+                    <a16:creationId xmlns="" xmlns:a16="http://schemas.microsoft.com/office/drawing/2014/main" id="{E4100E4F-C25C-43F5-900D-2CF6DFF0AA7A}"/>
                   </a:ext>
                 </a:extLst>
               </p:cNvPr>
@@ -9310,7 +9312,7 @@
               <p:cNvPr id="14" name="ZoneTexte 13">
                 <a:extLst>
                   <a:ext uri="{FF2B5EF4-FFF2-40B4-BE49-F238E27FC236}">
-                    <a16:creationId xmlns:a16="http://schemas.microsoft.com/office/drawing/2014/main" xmlns="" id="{AEAF1197-5FAE-4D74-84A5-8FA53524F64D}"/>
+                    <a16:creationId xmlns="" xmlns:a16="http://schemas.microsoft.com/office/drawing/2014/main" id="{AEAF1197-5FAE-4D74-84A5-8FA53524F64D}"/>
                   </a:ext>
                 </a:extLst>
               </p:cNvPr>
@@ -9362,7 +9364,7 @@
               <p:cNvPr id="15" name="Flèche vers la droite 129">
                 <a:extLst>
                   <a:ext uri="{FF2B5EF4-FFF2-40B4-BE49-F238E27FC236}">
-                    <a16:creationId xmlns:a16="http://schemas.microsoft.com/office/drawing/2014/main" xmlns="" id="{2A27B422-EDCC-423C-97A1-0F89C3E46FC8}"/>
+                    <a16:creationId xmlns="" xmlns:a16="http://schemas.microsoft.com/office/drawing/2014/main" id="{2A27B422-EDCC-423C-97A1-0F89C3E46FC8}"/>
                   </a:ext>
                 </a:extLst>
               </p:cNvPr>
@@ -9420,7 +9422,7 @@
               <p:cNvPr id="16" name="Flèche vers la droite 130">
                 <a:extLst>
                   <a:ext uri="{FF2B5EF4-FFF2-40B4-BE49-F238E27FC236}">
-                    <a16:creationId xmlns:a16="http://schemas.microsoft.com/office/drawing/2014/main" xmlns="" id="{DE535654-6DA4-491E-885F-393303F707AF}"/>
+                    <a16:creationId xmlns="" xmlns:a16="http://schemas.microsoft.com/office/drawing/2014/main" id="{DE535654-6DA4-491E-885F-393303F707AF}"/>
                   </a:ext>
                 </a:extLst>
               </p:cNvPr>
@@ -9478,7 +9480,7 @@
               <p:cNvPr id="17" name="Flèche vers la droite 131">
                 <a:extLst>
                   <a:ext uri="{FF2B5EF4-FFF2-40B4-BE49-F238E27FC236}">
-                    <a16:creationId xmlns:a16="http://schemas.microsoft.com/office/drawing/2014/main" xmlns="" id="{F202C734-D73A-4305-B572-92726DF1E6A6}"/>
+                    <a16:creationId xmlns="" xmlns:a16="http://schemas.microsoft.com/office/drawing/2014/main" id="{F202C734-D73A-4305-B572-92726DF1E6A6}"/>
                   </a:ext>
                 </a:extLst>
               </p:cNvPr>
@@ -9536,7 +9538,7 @@
               <p:cNvPr id="18" name="Flèche vers la droite 132">
                 <a:extLst>
                   <a:ext uri="{FF2B5EF4-FFF2-40B4-BE49-F238E27FC236}">
-                    <a16:creationId xmlns:a16="http://schemas.microsoft.com/office/drawing/2014/main" xmlns="" id="{F57D0BDA-50DA-4928-9540-9606334C0C69}"/>
+                    <a16:creationId xmlns="" xmlns:a16="http://schemas.microsoft.com/office/drawing/2014/main" id="{F57D0BDA-50DA-4928-9540-9606334C0C69}"/>
                   </a:ext>
                 </a:extLst>
               </p:cNvPr>
@@ -9594,7 +9596,7 @@
               <p:cNvPr id="19" name="ZoneTexte 18">
                 <a:extLst>
                   <a:ext uri="{FF2B5EF4-FFF2-40B4-BE49-F238E27FC236}">
-                    <a16:creationId xmlns:a16="http://schemas.microsoft.com/office/drawing/2014/main" xmlns="" id="{C3116ACA-C02F-45D2-8653-AA73A66F8C71}"/>
+                    <a16:creationId xmlns="" xmlns:a16="http://schemas.microsoft.com/office/drawing/2014/main" id="{C3116ACA-C02F-45D2-8653-AA73A66F8C71}"/>
                   </a:ext>
                 </a:extLst>
               </p:cNvPr>
@@ -9637,7 +9639,7 @@
               <p:cNvPr id="20" name="Flèche vers la droite 134">
                 <a:extLst>
                   <a:ext uri="{FF2B5EF4-FFF2-40B4-BE49-F238E27FC236}">
-                    <a16:creationId xmlns:a16="http://schemas.microsoft.com/office/drawing/2014/main" xmlns="" id="{1C16651C-6BB5-4AF5-A3D8-9AC0DCF4F750}"/>
+                    <a16:creationId xmlns="" xmlns:a16="http://schemas.microsoft.com/office/drawing/2014/main" id="{1C16651C-6BB5-4AF5-A3D8-9AC0DCF4F750}"/>
                   </a:ext>
                 </a:extLst>
               </p:cNvPr>
@@ -9695,7 +9697,7 @@
               <p:cNvPr id="21" name="ZoneTexte 20">
                 <a:extLst>
                   <a:ext uri="{FF2B5EF4-FFF2-40B4-BE49-F238E27FC236}">
-                    <a16:creationId xmlns:a16="http://schemas.microsoft.com/office/drawing/2014/main" xmlns="" id="{7F429A19-0C6C-4A63-BEE5-070599D6CA43}"/>
+                    <a16:creationId xmlns="" xmlns:a16="http://schemas.microsoft.com/office/drawing/2014/main" id="{7F429A19-0C6C-4A63-BEE5-070599D6CA43}"/>
                   </a:ext>
                 </a:extLst>
               </p:cNvPr>
@@ -9739,7 +9741,7 @@
               <p:cNvPr id="22" name="ZoneTexte 21">
                 <a:extLst>
                   <a:ext uri="{FF2B5EF4-FFF2-40B4-BE49-F238E27FC236}">
-                    <a16:creationId xmlns:a16="http://schemas.microsoft.com/office/drawing/2014/main" xmlns="" id="{F74F78E3-FF56-41C3-BE88-37E0EAD2CE28}"/>
+                    <a16:creationId xmlns="" xmlns:a16="http://schemas.microsoft.com/office/drawing/2014/main" id="{F74F78E3-FF56-41C3-BE88-37E0EAD2CE28}"/>
                   </a:ext>
                 </a:extLst>
               </p:cNvPr>
@@ -9774,7 +9776,7 @@
               <p:cNvPr id="23" name="Flèche vers la droite 137">
                 <a:extLst>
                   <a:ext uri="{FF2B5EF4-FFF2-40B4-BE49-F238E27FC236}">
-                    <a16:creationId xmlns:a16="http://schemas.microsoft.com/office/drawing/2014/main" xmlns="" id="{73786084-AA87-4592-B31C-A130EB131365}"/>
+                    <a16:creationId xmlns="" xmlns:a16="http://schemas.microsoft.com/office/drawing/2014/main" id="{73786084-AA87-4592-B31C-A130EB131365}"/>
                   </a:ext>
                 </a:extLst>
               </p:cNvPr>
@@ -9835,7 +9837,7 @@
                 <p:cNvPr id="9" name="ZoneTexte 8">
                   <a:extLst>
                     <a:ext uri="{FF2B5EF4-FFF2-40B4-BE49-F238E27FC236}">
-                      <a16:creationId xmlns:a16="http://schemas.microsoft.com/office/drawing/2014/main" xmlns="" id="{B2AD1845-005D-4D56-8DD3-7B8026BCC5A3}"/>
+                      <a16:creationId xmlns="" xmlns:a16="http://schemas.microsoft.com/office/drawing/2014/main" id="{B2AD1845-005D-4D56-8DD3-7B8026BCC5A3}"/>
                     </a:ext>
                   </a:extLst>
                 </p:cNvPr>
@@ -10508,15 +10510,7 @@
                   <a:srgbClr val="0070C0"/>
                 </a:solidFill>
               </a:rPr>
-              <a:t>  Synthèse industrielle </a:t>
-            </a:r>
-            <a:r>
-              <a:rPr lang="fr-FR" sz="3600" b="1" dirty="0" smtClean="0">
-                <a:solidFill>
-                  <a:srgbClr val="0070C0"/>
-                </a:solidFill>
-              </a:rPr>
-              <a:t>du </a:t>
+              <a:t>  Synthèse industrielle du </a:t>
             </a:r>
             <a:r>
               <a:rPr lang="fr-FR" sz="3600" b="1" dirty="0" err="1" smtClean="0">
@@ -10589,7 +10583,7 @@
           <p:nvPr>
             <p:extLst>
               <p:ext uri="{D42A27DB-BD31-4B8C-83A1-F6EECF244321}">
-                <p14:modId xmlns:p14="http://schemas.microsoft.com/office/powerpoint/2010/main" val="788754235"/>
+                <p14:modId xmlns:p14="http://schemas.microsoft.com/office/powerpoint/2010/main" val="3220504431"/>
               </p:ext>
             </p:extLst>
           </p:nvPr>
@@ -10804,9 +10798,23 @@
                       </a:r>
                       <a:r>
                         <a:rPr lang="fr-FR" baseline="0" dirty="0" smtClean="0"/>
-                        <a:t> élevée</a:t>
+                        <a:t> </a:t>
                       </a:r>
-                      <a:endParaRPr lang="fr-FR" dirty="0"/>
+                      <a:r>
+                        <a:rPr lang="fr-FR" baseline="0" dirty="0" smtClean="0"/>
+                        <a:t>élevée</a:t>
+                      </a:r>
+                    </a:p>
+                    <a:p>
+                      <a:r>
+                        <a:rPr lang="fr-FR" baseline="0" dirty="0" smtClean="0"/>
+                        <a:t>Diaphragme souvent en </a:t>
+                      </a:r>
+                      <a:r>
+                        <a:rPr lang="fr-FR" b="1" baseline="0" dirty="0" smtClean="0"/>
+                        <a:t>amiante</a:t>
+                      </a:r>
+                      <a:endParaRPr lang="fr-FR" b="1" dirty="0"/>
                     </a:p>
                   </a:txBody>
                   <a:tcPr/>
@@ -11017,7 +11025,7 @@
               <p:cNvPr id="86" name="ZoneTexte 85">
                 <a:extLst>
                   <a:ext uri="{FF2B5EF4-FFF2-40B4-BE49-F238E27FC236}">
-                    <a16:creationId xmlns:a16="http://schemas.microsoft.com/office/drawing/2014/main" xmlns="" id="{B2AD1845-005D-4D56-8DD3-7B8026BCC5A3}"/>
+                    <a16:creationId xmlns="" xmlns:a16="http://schemas.microsoft.com/office/drawing/2014/main" id="{B2AD1845-005D-4D56-8DD3-7B8026BCC5A3}"/>
                   </a:ext>
                 </a:extLst>
               </p:cNvPr>
@@ -11689,15 +11697,7 @@
                   <a:srgbClr val="0070C0"/>
                 </a:solidFill>
               </a:rPr>
-              <a:t>  Exemple de </a:t>
-            </a:r>
-            <a:r>
-              <a:rPr lang="fr-FR" sz="3600" b="1" dirty="0" smtClean="0">
-                <a:solidFill>
-                  <a:srgbClr val="0070C0"/>
-                </a:solidFill>
-              </a:rPr>
-              <a:t>complexe : l’</a:t>
+              <a:t>  Exemple de complexe : l’</a:t>
             </a:r>
             <a:r>
               <a:rPr lang="fr-FR" sz="3600" b="1" dirty="0" err="1" smtClean="0">
@@ -11952,7 +11952,7 @@
           <p:cNvPr id="7" name="Image 6">
             <a:extLst>
               <a:ext uri="{FF2B5EF4-FFF2-40B4-BE49-F238E27FC236}">
-                <a16:creationId xmlns:a16="http://schemas.microsoft.com/office/drawing/2014/main" xmlns="" id="{72C1696C-D7CB-49C0-ACD7-0768368612C5}"/>
+                <a16:creationId xmlns="" xmlns:a16="http://schemas.microsoft.com/office/drawing/2014/main" id="{72C1696C-D7CB-49C0-ACD7-0768368612C5}"/>
               </a:ext>
             </a:extLst>
           </p:cNvPr>
@@ -15323,959 +15323,9 @@
   <p:timing>
     <p:tnLst>
       <p:par>
-        <p:cTn id="1" dur="indefinite" restart="never" nodeType="tmRoot">
-          <p:childTnLst>
-            <p:seq concurrent="1" nextAc="seek">
-              <p:cTn id="2" dur="indefinite" nodeType="mainSeq">
-                <p:childTnLst>
-                  <p:par>
-                    <p:cTn id="3" fill="hold">
-                      <p:stCondLst>
-                        <p:cond delay="indefinite"/>
-                      </p:stCondLst>
-                      <p:childTnLst>
-                        <p:par>
-                          <p:cTn id="4" fill="hold">
-                            <p:stCondLst>
-                              <p:cond delay="0"/>
-                            </p:stCondLst>
-                            <p:childTnLst>
-                              <p:par>
-                                <p:cTn id="5" presetID="1" presetClass="entr" presetSubtype="0" fill="hold" grpId="0" nodeType="clickEffect">
-                                  <p:stCondLst>
-                                    <p:cond delay="0"/>
-                                  </p:stCondLst>
-                                  <p:childTnLst>
-                                    <p:set>
-                                      <p:cBhvr>
-                                        <p:cTn id="6" dur="1" fill="hold">
-                                          <p:stCondLst>
-                                            <p:cond delay="0"/>
-                                          </p:stCondLst>
-                                        </p:cTn>
-                                        <p:tgtEl>
-                                          <p:spTgt spid="16"/>
-                                        </p:tgtEl>
-                                        <p:attrNameLst>
-                                          <p:attrName>style.visibility</p:attrName>
-                                        </p:attrNameLst>
-                                      </p:cBhvr>
-                                      <p:to>
-                                        <p:strVal val="visible"/>
-                                      </p:to>
-                                    </p:set>
-                                  </p:childTnLst>
-                                </p:cTn>
-                              </p:par>
-                              <p:par>
-                                <p:cTn id="7" presetID="1" presetClass="entr" presetSubtype="0" fill="hold" grpId="0" nodeType="withEffect">
-                                  <p:stCondLst>
-                                    <p:cond delay="0"/>
-                                  </p:stCondLst>
-                                  <p:childTnLst>
-                                    <p:set>
-                                      <p:cBhvr>
-                                        <p:cTn id="8" dur="1" fill="hold">
-                                          <p:stCondLst>
-                                            <p:cond delay="0"/>
-                                          </p:stCondLst>
-                                        </p:cTn>
-                                        <p:tgtEl>
-                                          <p:spTgt spid="21"/>
-                                        </p:tgtEl>
-                                        <p:attrNameLst>
-                                          <p:attrName>style.visibility</p:attrName>
-                                        </p:attrNameLst>
-                                      </p:cBhvr>
-                                      <p:to>
-                                        <p:strVal val="visible"/>
-                                      </p:to>
-                                    </p:set>
-                                  </p:childTnLst>
-                                </p:cTn>
-                              </p:par>
-                            </p:childTnLst>
-                          </p:cTn>
-                        </p:par>
-                      </p:childTnLst>
-                    </p:cTn>
-                  </p:par>
-                  <p:par>
-                    <p:cTn id="9" fill="hold">
-                      <p:stCondLst>
-                        <p:cond delay="indefinite"/>
-                      </p:stCondLst>
-                      <p:childTnLst>
-                        <p:par>
-                          <p:cTn id="10" fill="hold">
-                            <p:stCondLst>
-                              <p:cond delay="0"/>
-                            </p:stCondLst>
-                            <p:childTnLst>
-                              <p:par>
-                                <p:cTn id="11" presetID="1" presetClass="entr" presetSubtype="0" fill="hold" nodeType="clickEffect">
-                                  <p:stCondLst>
-                                    <p:cond delay="0"/>
-                                  </p:stCondLst>
-                                  <p:childTnLst>
-                                    <p:set>
-                                      <p:cBhvr>
-                                        <p:cTn id="12" dur="1" fill="hold">
-                                          <p:stCondLst>
-                                            <p:cond delay="0"/>
-                                          </p:stCondLst>
-                                        </p:cTn>
-                                        <p:tgtEl>
-                                          <p:spTgt spid="2"/>
-                                        </p:tgtEl>
-                                        <p:attrNameLst>
-                                          <p:attrName>style.visibility</p:attrName>
-                                        </p:attrNameLst>
-                                      </p:cBhvr>
-                                      <p:to>
-                                        <p:strVal val="visible"/>
-                                      </p:to>
-                                    </p:set>
-                                  </p:childTnLst>
-                                </p:cTn>
-                              </p:par>
-                              <p:par>
-                                <p:cTn id="13" presetID="1" presetClass="entr" presetSubtype="0" fill="hold" nodeType="withEffect">
-                                  <p:stCondLst>
-                                    <p:cond delay="0"/>
-                                  </p:stCondLst>
-                                  <p:childTnLst>
-                                    <p:set>
-                                      <p:cBhvr>
-                                        <p:cTn id="14" dur="1" fill="hold">
-                                          <p:stCondLst>
-                                            <p:cond delay="0"/>
-                                          </p:stCondLst>
-                                        </p:cTn>
-                                        <p:tgtEl>
-                                          <p:spTgt spid="31"/>
-                                        </p:tgtEl>
-                                        <p:attrNameLst>
-                                          <p:attrName>style.visibility</p:attrName>
-                                        </p:attrNameLst>
-                                      </p:cBhvr>
-                                      <p:to>
-                                        <p:strVal val="visible"/>
-                                      </p:to>
-                                    </p:set>
-                                  </p:childTnLst>
-                                </p:cTn>
-                              </p:par>
-                              <p:par>
-                                <p:cTn id="15" presetID="1" presetClass="entr" presetSubtype="0" fill="hold" nodeType="withEffect">
-                                  <p:stCondLst>
-                                    <p:cond delay="0"/>
-                                  </p:stCondLst>
-                                  <p:childTnLst>
-                                    <p:set>
-                                      <p:cBhvr>
-                                        <p:cTn id="16" dur="1" fill="hold">
-                                          <p:stCondLst>
-                                            <p:cond delay="0"/>
-                                          </p:stCondLst>
-                                        </p:cTn>
-                                        <p:tgtEl>
-                                          <p:spTgt spid="36"/>
-                                        </p:tgtEl>
-                                        <p:attrNameLst>
-                                          <p:attrName>style.visibility</p:attrName>
-                                        </p:attrNameLst>
-                                      </p:cBhvr>
-                                      <p:to>
-                                        <p:strVal val="visible"/>
-                                      </p:to>
-                                    </p:set>
-                                  </p:childTnLst>
-                                </p:cTn>
-                              </p:par>
-                              <p:par>
-                                <p:cTn id="17" presetID="1" presetClass="entr" presetSubtype="0" fill="hold" nodeType="withEffect">
-                                  <p:stCondLst>
-                                    <p:cond delay="0"/>
-                                  </p:stCondLst>
-                                  <p:childTnLst>
-                                    <p:set>
-                                      <p:cBhvr>
-                                        <p:cTn id="18" dur="1" fill="hold">
-                                          <p:stCondLst>
-                                            <p:cond delay="0"/>
-                                          </p:stCondLst>
-                                        </p:cTn>
-                                        <p:tgtEl>
-                                          <p:spTgt spid="35"/>
-                                        </p:tgtEl>
-                                        <p:attrNameLst>
-                                          <p:attrName>style.visibility</p:attrName>
-                                        </p:attrNameLst>
-                                      </p:cBhvr>
-                                      <p:to>
-                                        <p:strVal val="visible"/>
-                                      </p:to>
-                                    </p:set>
-                                  </p:childTnLst>
-                                </p:cTn>
-                              </p:par>
-                              <p:par>
-                                <p:cTn id="19" presetID="1" presetClass="entr" presetSubtype="0" fill="hold" nodeType="withEffect">
-                                  <p:stCondLst>
-                                    <p:cond delay="0"/>
-                                  </p:stCondLst>
-                                  <p:childTnLst>
-                                    <p:set>
-                                      <p:cBhvr>
-                                        <p:cTn id="20" dur="1" fill="hold">
-                                          <p:stCondLst>
-                                            <p:cond delay="0"/>
-                                          </p:stCondLst>
-                                        </p:cTn>
-                                        <p:tgtEl>
-                                          <p:spTgt spid="33"/>
-                                        </p:tgtEl>
-                                        <p:attrNameLst>
-                                          <p:attrName>style.visibility</p:attrName>
-                                        </p:attrNameLst>
-                                      </p:cBhvr>
-                                      <p:to>
-                                        <p:strVal val="visible"/>
-                                      </p:to>
-                                    </p:set>
-                                  </p:childTnLst>
-                                </p:cTn>
-                              </p:par>
-                              <p:par>
-                                <p:cTn id="21" presetID="1" presetClass="entr" presetSubtype="0" fill="hold" nodeType="withEffect">
-                                  <p:stCondLst>
-                                    <p:cond delay="0"/>
-                                  </p:stCondLst>
-                                  <p:childTnLst>
-                                    <p:set>
-                                      <p:cBhvr>
-                                        <p:cTn id="22" dur="1" fill="hold">
-                                          <p:stCondLst>
-                                            <p:cond delay="0"/>
-                                          </p:stCondLst>
-                                        </p:cTn>
-                                        <p:tgtEl>
-                                          <p:spTgt spid="34"/>
-                                        </p:tgtEl>
-                                        <p:attrNameLst>
-                                          <p:attrName>style.visibility</p:attrName>
-                                        </p:attrNameLst>
-                                      </p:cBhvr>
-                                      <p:to>
-                                        <p:strVal val="visible"/>
-                                      </p:to>
-                                    </p:set>
-                                  </p:childTnLst>
-                                </p:cTn>
-                              </p:par>
-                              <p:par>
-                                <p:cTn id="23" presetID="1" presetClass="entr" presetSubtype="0" fill="hold" nodeType="withEffect">
-                                  <p:stCondLst>
-                                    <p:cond delay="0"/>
-                                  </p:stCondLst>
-                                  <p:childTnLst>
-                                    <p:set>
-                                      <p:cBhvr>
-                                        <p:cTn id="24" dur="1" fill="hold">
-                                          <p:stCondLst>
-                                            <p:cond delay="0"/>
-                                          </p:stCondLst>
-                                        </p:cTn>
-                                        <p:tgtEl>
-                                          <p:spTgt spid="42"/>
-                                        </p:tgtEl>
-                                        <p:attrNameLst>
-                                          <p:attrName>style.visibility</p:attrName>
-                                        </p:attrNameLst>
-                                      </p:cBhvr>
-                                      <p:to>
-                                        <p:strVal val="visible"/>
-                                      </p:to>
-                                    </p:set>
-                                  </p:childTnLst>
-                                </p:cTn>
-                              </p:par>
-                              <p:par>
-                                <p:cTn id="25" presetID="1" presetClass="entr" presetSubtype="0" fill="hold" nodeType="withEffect">
-                                  <p:stCondLst>
-                                    <p:cond delay="0"/>
-                                  </p:stCondLst>
-                                  <p:childTnLst>
-                                    <p:set>
-                                      <p:cBhvr>
-                                        <p:cTn id="26" dur="1" fill="hold">
-                                          <p:stCondLst>
-                                            <p:cond delay="0"/>
-                                          </p:stCondLst>
-                                        </p:cTn>
-                                        <p:tgtEl>
-                                          <p:spTgt spid="41"/>
-                                        </p:tgtEl>
-                                        <p:attrNameLst>
-                                          <p:attrName>style.visibility</p:attrName>
-                                        </p:attrNameLst>
-                                      </p:cBhvr>
-                                      <p:to>
-                                        <p:strVal val="visible"/>
-                                      </p:to>
-                                    </p:set>
-                                  </p:childTnLst>
-                                </p:cTn>
-                              </p:par>
-                              <p:par>
-                                <p:cTn id="27" presetID="1" presetClass="entr" presetSubtype="0" fill="hold" nodeType="withEffect">
-                                  <p:stCondLst>
-                                    <p:cond delay="0"/>
-                                  </p:stCondLst>
-                                  <p:childTnLst>
-                                    <p:set>
-                                      <p:cBhvr>
-                                        <p:cTn id="28" dur="1" fill="hold">
-                                          <p:stCondLst>
-                                            <p:cond delay="0"/>
-                                          </p:stCondLst>
-                                        </p:cTn>
-                                        <p:tgtEl>
-                                          <p:spTgt spid="32"/>
-                                        </p:tgtEl>
-                                        <p:attrNameLst>
-                                          <p:attrName>style.visibility</p:attrName>
-                                        </p:attrNameLst>
-                                      </p:cBhvr>
-                                      <p:to>
-                                        <p:strVal val="visible"/>
-                                      </p:to>
-                                    </p:set>
-                                  </p:childTnLst>
-                                </p:cTn>
-                              </p:par>
-                              <p:par>
-                                <p:cTn id="29" presetID="1" presetClass="entr" presetSubtype="0" fill="hold" nodeType="withEffect">
-                                  <p:stCondLst>
-                                    <p:cond delay="0"/>
-                                  </p:stCondLst>
-                                  <p:childTnLst>
-                                    <p:set>
-                                      <p:cBhvr>
-                                        <p:cTn id="30" dur="1" fill="hold">
-                                          <p:stCondLst>
-                                            <p:cond delay="0"/>
-                                          </p:stCondLst>
-                                        </p:cTn>
-                                        <p:tgtEl>
-                                          <p:spTgt spid="30"/>
-                                        </p:tgtEl>
-                                        <p:attrNameLst>
-                                          <p:attrName>style.visibility</p:attrName>
-                                        </p:attrNameLst>
-                                      </p:cBhvr>
-                                      <p:to>
-                                        <p:strVal val="visible"/>
-                                      </p:to>
-                                    </p:set>
-                                  </p:childTnLst>
-                                </p:cTn>
-                              </p:par>
-                              <p:par>
-                                <p:cTn id="31" presetID="1" presetClass="entr" presetSubtype="0" fill="hold" nodeType="withEffect">
-                                  <p:stCondLst>
-                                    <p:cond delay="0"/>
-                                  </p:stCondLst>
-                                  <p:childTnLst>
-                                    <p:set>
-                                      <p:cBhvr>
-                                        <p:cTn id="32" dur="1" fill="hold">
-                                          <p:stCondLst>
-                                            <p:cond delay="0"/>
-                                          </p:stCondLst>
-                                        </p:cTn>
-                                        <p:tgtEl>
-                                          <p:spTgt spid="29"/>
-                                        </p:tgtEl>
-                                        <p:attrNameLst>
-                                          <p:attrName>style.visibility</p:attrName>
-                                        </p:attrNameLst>
-                                      </p:cBhvr>
-                                      <p:to>
-                                        <p:strVal val="visible"/>
-                                      </p:to>
-                                    </p:set>
-                                  </p:childTnLst>
-                                </p:cTn>
-                              </p:par>
-                            </p:childTnLst>
-                          </p:cTn>
-                        </p:par>
-                      </p:childTnLst>
-                    </p:cTn>
-                  </p:par>
-                  <p:par>
-                    <p:cTn id="33" fill="hold">
-                      <p:stCondLst>
-                        <p:cond delay="indefinite"/>
-                      </p:stCondLst>
-                      <p:childTnLst>
-                        <p:par>
-                          <p:cTn id="34" fill="hold">
-                            <p:stCondLst>
-                              <p:cond delay="0"/>
-                            </p:stCondLst>
-                            <p:childTnLst>
-                              <p:par>
-                                <p:cTn id="35" presetID="1" presetClass="entr" presetSubtype="0" fill="hold" grpId="0" nodeType="clickEffect">
-                                  <p:stCondLst>
-                                    <p:cond delay="0"/>
-                                  </p:stCondLst>
-                                  <p:childTnLst>
-                                    <p:set>
-                                      <p:cBhvr>
-                                        <p:cTn id="36" dur="1" fill="hold">
-                                          <p:stCondLst>
-                                            <p:cond delay="0"/>
-                                          </p:stCondLst>
-                                        </p:cTn>
-                                        <p:tgtEl>
-                                          <p:spTgt spid="11"/>
-                                        </p:tgtEl>
-                                        <p:attrNameLst>
-                                          <p:attrName>style.visibility</p:attrName>
-                                        </p:attrNameLst>
-                                      </p:cBhvr>
-                                      <p:to>
-                                        <p:strVal val="visible"/>
-                                      </p:to>
-                                    </p:set>
-                                  </p:childTnLst>
-                                </p:cTn>
-                              </p:par>
-                              <p:par>
-                                <p:cTn id="37" presetID="1" presetClass="entr" presetSubtype="0" fill="hold" grpId="0" nodeType="withEffect">
-                                  <p:stCondLst>
-                                    <p:cond delay="0"/>
-                                  </p:stCondLst>
-                                  <p:childTnLst>
-                                    <p:set>
-                                      <p:cBhvr>
-                                        <p:cTn id="38" dur="1" fill="hold">
-                                          <p:stCondLst>
-                                            <p:cond delay="0"/>
-                                          </p:stCondLst>
-                                        </p:cTn>
-                                        <p:tgtEl>
-                                          <p:spTgt spid="13"/>
-                                        </p:tgtEl>
-                                        <p:attrNameLst>
-                                          <p:attrName>style.visibility</p:attrName>
-                                        </p:attrNameLst>
-                                      </p:cBhvr>
-                                      <p:to>
-                                        <p:strVal val="visible"/>
-                                      </p:to>
-                                    </p:set>
-                                  </p:childTnLst>
-                                </p:cTn>
-                              </p:par>
-                              <p:par>
-                                <p:cTn id="39" presetID="1" presetClass="entr" presetSubtype="0" fill="hold" grpId="0" nodeType="withEffect">
-                                  <p:stCondLst>
-                                    <p:cond delay="0"/>
-                                  </p:stCondLst>
-                                  <p:childTnLst>
-                                    <p:set>
-                                      <p:cBhvr>
-                                        <p:cTn id="40" dur="1" fill="hold">
-                                          <p:stCondLst>
-                                            <p:cond delay="0"/>
-                                          </p:stCondLst>
-                                        </p:cTn>
-                                        <p:tgtEl>
-                                          <p:spTgt spid="14"/>
-                                        </p:tgtEl>
-                                        <p:attrNameLst>
-                                          <p:attrName>style.visibility</p:attrName>
-                                        </p:attrNameLst>
-                                      </p:cBhvr>
-                                      <p:to>
-                                        <p:strVal val="visible"/>
-                                      </p:to>
-                                    </p:set>
-                                  </p:childTnLst>
-                                </p:cTn>
-                              </p:par>
-                              <p:par>
-                                <p:cTn id="41" presetID="1" presetClass="entr" presetSubtype="0" fill="hold" grpId="0" nodeType="withEffect">
-                                  <p:stCondLst>
-                                    <p:cond delay="0"/>
-                                  </p:stCondLst>
-                                  <p:childTnLst>
-                                    <p:set>
-                                      <p:cBhvr>
-                                        <p:cTn id="42" dur="1" fill="hold">
-                                          <p:stCondLst>
-                                            <p:cond delay="0"/>
-                                          </p:stCondLst>
-                                        </p:cTn>
-                                        <p:tgtEl>
-                                          <p:spTgt spid="15"/>
-                                        </p:tgtEl>
-                                        <p:attrNameLst>
-                                          <p:attrName>style.visibility</p:attrName>
-                                        </p:attrNameLst>
-                                      </p:cBhvr>
-                                      <p:to>
-                                        <p:strVal val="visible"/>
-                                      </p:to>
-                                    </p:set>
-                                  </p:childTnLst>
-                                </p:cTn>
-                              </p:par>
-                              <p:par>
-                                <p:cTn id="43" presetID="1" presetClass="entr" presetSubtype="0" fill="hold" grpId="0" nodeType="withEffect">
-                                  <p:stCondLst>
-                                    <p:cond delay="0"/>
-                                  </p:stCondLst>
-                                  <p:childTnLst>
-                                    <p:set>
-                                      <p:cBhvr>
-                                        <p:cTn id="44" dur="1" fill="hold">
-                                          <p:stCondLst>
-                                            <p:cond delay="0"/>
-                                          </p:stCondLst>
-                                        </p:cTn>
-                                        <p:tgtEl>
-                                          <p:spTgt spid="12"/>
-                                        </p:tgtEl>
-                                        <p:attrNameLst>
-                                          <p:attrName>style.visibility</p:attrName>
-                                        </p:attrNameLst>
-                                      </p:cBhvr>
-                                      <p:to>
-                                        <p:strVal val="visible"/>
-                                      </p:to>
-                                    </p:set>
-                                  </p:childTnLst>
-                                </p:cTn>
-                              </p:par>
-                              <p:par>
-                                <p:cTn id="45" presetID="1" presetClass="entr" presetSubtype="0" fill="hold" grpId="0" nodeType="withEffect">
-                                  <p:stCondLst>
-                                    <p:cond delay="0"/>
-                                  </p:stCondLst>
-                                  <p:childTnLst>
-                                    <p:set>
-                                      <p:cBhvr>
-                                        <p:cTn id="46" dur="1" fill="hold">
-                                          <p:stCondLst>
-                                            <p:cond delay="0"/>
-                                          </p:stCondLst>
-                                        </p:cTn>
-                                        <p:tgtEl>
-                                          <p:spTgt spid="17"/>
-                                        </p:tgtEl>
-                                        <p:attrNameLst>
-                                          <p:attrName>style.visibility</p:attrName>
-                                        </p:attrNameLst>
-                                      </p:cBhvr>
-                                      <p:to>
-                                        <p:strVal val="visible"/>
-                                      </p:to>
-                                    </p:set>
-                                  </p:childTnLst>
-                                </p:cTn>
-                              </p:par>
-                              <p:par>
-                                <p:cTn id="47" presetID="1" presetClass="entr" presetSubtype="0" fill="hold" grpId="0" nodeType="withEffect">
-                                  <p:stCondLst>
-                                    <p:cond delay="0"/>
-                                  </p:stCondLst>
-                                  <p:childTnLst>
-                                    <p:set>
-                                      <p:cBhvr>
-                                        <p:cTn id="48" dur="1" fill="hold">
-                                          <p:stCondLst>
-                                            <p:cond delay="0"/>
-                                          </p:stCondLst>
-                                        </p:cTn>
-                                        <p:tgtEl>
-                                          <p:spTgt spid="18"/>
-                                        </p:tgtEl>
-                                        <p:attrNameLst>
-                                          <p:attrName>style.visibility</p:attrName>
-                                        </p:attrNameLst>
-                                      </p:cBhvr>
-                                      <p:to>
-                                        <p:strVal val="visible"/>
-                                      </p:to>
-                                    </p:set>
-                                  </p:childTnLst>
-                                </p:cTn>
-                              </p:par>
-                              <p:par>
-                                <p:cTn id="49" presetID="1" presetClass="entr" presetSubtype="0" fill="hold" grpId="0" nodeType="withEffect">
-                                  <p:stCondLst>
-                                    <p:cond delay="0"/>
-                                  </p:stCondLst>
-                                  <p:childTnLst>
-                                    <p:set>
-                                      <p:cBhvr>
-                                        <p:cTn id="50" dur="1" fill="hold">
-                                          <p:stCondLst>
-                                            <p:cond delay="0"/>
-                                          </p:stCondLst>
-                                        </p:cTn>
-                                        <p:tgtEl>
-                                          <p:spTgt spid="19"/>
-                                        </p:tgtEl>
-                                        <p:attrNameLst>
-                                          <p:attrName>style.visibility</p:attrName>
-                                        </p:attrNameLst>
-                                      </p:cBhvr>
-                                      <p:to>
-                                        <p:strVal val="visible"/>
-                                      </p:to>
-                                    </p:set>
-                                  </p:childTnLst>
-                                </p:cTn>
-                              </p:par>
-                              <p:par>
-                                <p:cTn id="51" presetID="1" presetClass="entr" presetSubtype="0" fill="hold" nodeType="withEffect">
-                                  <p:stCondLst>
-                                    <p:cond delay="0"/>
-                                  </p:stCondLst>
-                                  <p:childTnLst>
-                                    <p:set>
-                                      <p:cBhvr>
-                                        <p:cTn id="52" dur="1" fill="hold">
-                                          <p:stCondLst>
-                                            <p:cond delay="0"/>
-                                          </p:stCondLst>
-                                        </p:cTn>
-                                        <p:tgtEl>
-                                          <p:spTgt spid="38"/>
-                                        </p:tgtEl>
-                                        <p:attrNameLst>
-                                          <p:attrName>style.visibility</p:attrName>
-                                        </p:attrNameLst>
-                                      </p:cBhvr>
-                                      <p:to>
-                                        <p:strVal val="visible"/>
-                                      </p:to>
-                                    </p:set>
-                                  </p:childTnLst>
-                                </p:cTn>
-                              </p:par>
-                              <p:par>
-                                <p:cTn id="53" presetID="1" presetClass="entr" presetSubtype="0" fill="hold" nodeType="withEffect">
-                                  <p:stCondLst>
-                                    <p:cond delay="0"/>
-                                  </p:stCondLst>
-                                  <p:childTnLst>
-                                    <p:set>
-                                      <p:cBhvr>
-                                        <p:cTn id="54" dur="1" fill="hold">
-                                          <p:stCondLst>
-                                            <p:cond delay="0"/>
-                                          </p:stCondLst>
-                                        </p:cTn>
-                                        <p:tgtEl>
-                                          <p:spTgt spid="37"/>
-                                        </p:tgtEl>
-                                        <p:attrNameLst>
-                                          <p:attrName>style.visibility</p:attrName>
-                                        </p:attrNameLst>
-                                      </p:cBhvr>
-                                      <p:to>
-                                        <p:strVal val="visible"/>
-                                      </p:to>
-                                    </p:set>
-                                  </p:childTnLst>
-                                </p:cTn>
-                              </p:par>
-                              <p:par>
-                                <p:cTn id="55" presetID="1" presetClass="entr" presetSubtype="0" fill="hold" nodeType="withEffect">
-                                  <p:stCondLst>
-                                    <p:cond delay="0"/>
-                                  </p:stCondLst>
-                                  <p:childTnLst>
-                                    <p:set>
-                                      <p:cBhvr>
-                                        <p:cTn id="56" dur="1" fill="hold">
-                                          <p:stCondLst>
-                                            <p:cond delay="0"/>
-                                          </p:stCondLst>
-                                        </p:cTn>
-                                        <p:tgtEl>
-                                          <p:spTgt spid="40"/>
-                                        </p:tgtEl>
-                                        <p:attrNameLst>
-                                          <p:attrName>style.visibility</p:attrName>
-                                        </p:attrNameLst>
-                                      </p:cBhvr>
-                                      <p:to>
-                                        <p:strVal val="visible"/>
-                                      </p:to>
-                                    </p:set>
-                                  </p:childTnLst>
-                                </p:cTn>
-                              </p:par>
-                              <p:par>
-                                <p:cTn id="57" presetID="1" presetClass="entr" presetSubtype="0" fill="hold" nodeType="withEffect">
-                                  <p:stCondLst>
-                                    <p:cond delay="0"/>
-                                  </p:stCondLst>
-                                  <p:childTnLst>
-                                    <p:set>
-                                      <p:cBhvr>
-                                        <p:cTn id="58" dur="1" fill="hold">
-                                          <p:stCondLst>
-                                            <p:cond delay="0"/>
-                                          </p:stCondLst>
-                                        </p:cTn>
-                                        <p:tgtEl>
-                                          <p:spTgt spid="39"/>
-                                        </p:tgtEl>
-                                        <p:attrNameLst>
-                                          <p:attrName>style.visibility</p:attrName>
-                                        </p:attrNameLst>
-                                      </p:cBhvr>
-                                      <p:to>
-                                        <p:strVal val="visible"/>
-                                      </p:to>
-                                    </p:set>
-                                  </p:childTnLst>
-                                </p:cTn>
-                              </p:par>
-                            </p:childTnLst>
-                          </p:cTn>
-                        </p:par>
-                      </p:childTnLst>
-                    </p:cTn>
-                  </p:par>
-                  <p:par>
-                    <p:cTn id="59" fill="hold">
-                      <p:stCondLst>
-                        <p:cond delay="indefinite"/>
-                      </p:stCondLst>
-                      <p:childTnLst>
-                        <p:par>
-                          <p:cTn id="60" fill="hold">
-                            <p:stCondLst>
-                              <p:cond delay="0"/>
-                            </p:stCondLst>
-                            <p:childTnLst>
-                              <p:par>
-                                <p:cTn id="61" presetID="1" presetClass="entr" presetSubtype="0" fill="hold" grpId="0" nodeType="clickEffect">
-                                  <p:stCondLst>
-                                    <p:cond delay="0"/>
-                                  </p:stCondLst>
-                                  <p:childTnLst>
-                                    <p:set>
-                                      <p:cBhvr>
-                                        <p:cTn id="62" dur="1" fill="hold">
-                                          <p:stCondLst>
-                                            <p:cond delay="0"/>
-                                          </p:stCondLst>
-                                        </p:cTn>
-                                        <p:tgtEl>
-                                          <p:spTgt spid="22"/>
-                                        </p:tgtEl>
-                                        <p:attrNameLst>
-                                          <p:attrName>style.visibility</p:attrName>
-                                        </p:attrNameLst>
-                                      </p:cBhvr>
-                                      <p:to>
-                                        <p:strVal val="visible"/>
-                                      </p:to>
-                                    </p:set>
-                                  </p:childTnLst>
-                                </p:cTn>
-                              </p:par>
-                              <p:par>
-                                <p:cTn id="63" presetID="1" presetClass="entr" presetSubtype="0" fill="hold" grpId="0" nodeType="withEffect">
-                                  <p:stCondLst>
-                                    <p:cond delay="0"/>
-                                  </p:stCondLst>
-                                  <p:childTnLst>
-                                    <p:set>
-                                      <p:cBhvr>
-                                        <p:cTn id="64" dur="1" fill="hold">
-                                          <p:stCondLst>
-                                            <p:cond delay="0"/>
-                                          </p:stCondLst>
-                                        </p:cTn>
-                                        <p:tgtEl>
-                                          <p:spTgt spid="23"/>
-                                        </p:tgtEl>
-                                        <p:attrNameLst>
-                                          <p:attrName>style.visibility</p:attrName>
-                                        </p:attrNameLst>
-                                      </p:cBhvr>
-                                      <p:to>
-                                        <p:strVal val="visible"/>
-                                      </p:to>
-                                    </p:set>
-                                  </p:childTnLst>
-                                </p:cTn>
-                              </p:par>
-                              <p:par>
-                                <p:cTn id="65" presetID="1" presetClass="entr" presetSubtype="0" fill="hold" grpId="0" nodeType="withEffect">
-                                  <p:stCondLst>
-                                    <p:cond delay="0"/>
-                                  </p:stCondLst>
-                                  <p:childTnLst>
-                                    <p:set>
-                                      <p:cBhvr>
-                                        <p:cTn id="66" dur="1" fill="hold">
-                                          <p:stCondLst>
-                                            <p:cond delay="0"/>
-                                          </p:stCondLst>
-                                        </p:cTn>
-                                        <p:tgtEl>
-                                          <p:spTgt spid="24"/>
-                                        </p:tgtEl>
-                                        <p:attrNameLst>
-                                          <p:attrName>style.visibility</p:attrName>
-                                        </p:attrNameLst>
-                                      </p:cBhvr>
-                                      <p:to>
-                                        <p:strVal val="visible"/>
-                                      </p:to>
-                                    </p:set>
-                                  </p:childTnLst>
-                                </p:cTn>
-                              </p:par>
-                              <p:par>
-                                <p:cTn id="67" presetID="1" presetClass="entr" presetSubtype="0" fill="hold" grpId="0" nodeType="withEffect">
-                                  <p:stCondLst>
-                                    <p:cond delay="0"/>
-                                  </p:stCondLst>
-                                  <p:childTnLst>
-                                    <p:set>
-                                      <p:cBhvr>
-                                        <p:cTn id="68" dur="1" fill="hold">
-                                          <p:stCondLst>
-                                            <p:cond delay="0"/>
-                                          </p:stCondLst>
-                                        </p:cTn>
-                                        <p:tgtEl>
-                                          <p:spTgt spid="25"/>
-                                        </p:tgtEl>
-                                        <p:attrNameLst>
-                                          <p:attrName>style.visibility</p:attrName>
-                                        </p:attrNameLst>
-                                      </p:cBhvr>
-                                      <p:to>
-                                        <p:strVal val="visible"/>
-                                      </p:to>
-                                    </p:set>
-                                  </p:childTnLst>
-                                </p:cTn>
-                              </p:par>
-                              <p:par>
-                                <p:cTn id="69" presetID="1" presetClass="entr" presetSubtype="0" fill="hold" grpId="0" nodeType="withEffect">
-                                  <p:stCondLst>
-                                    <p:cond delay="0"/>
-                                  </p:stCondLst>
-                                  <p:childTnLst>
-                                    <p:set>
-                                      <p:cBhvr>
-                                        <p:cTn id="70" dur="1" fill="hold">
-                                          <p:stCondLst>
-                                            <p:cond delay="0"/>
-                                          </p:stCondLst>
-                                        </p:cTn>
-                                        <p:tgtEl>
-                                          <p:spTgt spid="26"/>
-                                        </p:tgtEl>
-                                        <p:attrNameLst>
-                                          <p:attrName>style.visibility</p:attrName>
-                                        </p:attrNameLst>
-                                      </p:cBhvr>
-                                      <p:to>
-                                        <p:strVal val="visible"/>
-                                      </p:to>
-                                    </p:set>
-                                  </p:childTnLst>
-                                </p:cTn>
-                              </p:par>
-                              <p:par>
-                                <p:cTn id="71" presetID="1" presetClass="entr" presetSubtype="0" fill="hold" grpId="0" nodeType="withEffect">
-                                  <p:stCondLst>
-                                    <p:cond delay="0"/>
-                                  </p:stCondLst>
-                                  <p:childTnLst>
-                                    <p:set>
-                                      <p:cBhvr>
-                                        <p:cTn id="72" dur="1" fill="hold">
-                                          <p:stCondLst>
-                                            <p:cond delay="0"/>
-                                          </p:stCondLst>
-                                        </p:cTn>
-                                        <p:tgtEl>
-                                          <p:spTgt spid="27"/>
-                                        </p:tgtEl>
-                                        <p:attrNameLst>
-                                          <p:attrName>style.visibility</p:attrName>
-                                        </p:attrNameLst>
-                                      </p:cBhvr>
-                                      <p:to>
-                                        <p:strVal val="visible"/>
-                                      </p:to>
-                                    </p:set>
-                                  </p:childTnLst>
-                                </p:cTn>
-                              </p:par>
-                            </p:childTnLst>
-                          </p:cTn>
-                        </p:par>
-                      </p:childTnLst>
-                    </p:cTn>
-                  </p:par>
-                </p:childTnLst>
-              </p:cTn>
-              <p:prevCondLst>
-                <p:cond evt="onPrev" delay="0">
-                  <p:tgtEl>
-                    <p:sldTgt/>
-                  </p:tgtEl>
-                </p:cond>
-              </p:prevCondLst>
-              <p:nextCondLst>
-                <p:cond evt="onNext" delay="0">
-                  <p:tgtEl>
-                    <p:sldTgt/>
-                  </p:tgtEl>
-                </p:cond>
-              </p:nextCondLst>
-            </p:seq>
-          </p:childTnLst>
-        </p:cTn>
+        <p:cTn id="1" dur="indefinite" restart="never" nodeType="tmRoot"/>
       </p:par>
     </p:tnLst>
-    <p:bldLst>
-      <p:bldP spid="11" grpId="0" animBg="1"/>
-      <p:bldP spid="13" grpId="0" animBg="1"/>
-      <p:bldP spid="14" grpId="0" animBg="1"/>
-      <p:bldP spid="15" grpId="0" animBg="1"/>
-      <p:bldP spid="12" grpId="0"/>
-      <p:bldP spid="17" grpId="0"/>
-      <p:bldP spid="18" grpId="0"/>
-      <p:bldP spid="19" grpId="0"/>
-      <p:bldP spid="16" grpId="0" animBg="1"/>
-      <p:bldP spid="21" grpId="0" animBg="1"/>
-      <p:bldP spid="22" grpId="0" animBg="1"/>
-      <p:bldP spid="23" grpId="0" animBg="1"/>
-      <p:bldP spid="24" grpId="0" animBg="1"/>
-      <p:bldP spid="25" grpId="0" animBg="1"/>
-      <p:bldP spid="26" grpId="0" animBg="1"/>
-      <p:bldP spid="27" grpId="0" animBg="1"/>
-    </p:bldLst>
   </p:timing>
 </p:sld>
 </file>
@@ -16495,7 +15545,7 @@
               <p:cNvPr id="10" name="ZoneTexte 9">
                 <a:extLst>
                   <a:ext uri="{FF2B5EF4-FFF2-40B4-BE49-F238E27FC236}">
-                    <a16:creationId xmlns:a16="http://schemas.microsoft.com/office/drawing/2014/main" xmlns="" id="{B2AD1845-005D-4D56-8DD3-7B8026BCC5A3}"/>
+                    <a16:creationId xmlns="" xmlns:a16="http://schemas.microsoft.com/office/drawing/2014/main" id="{B2AD1845-005D-4D56-8DD3-7B8026BCC5A3}"/>
                   </a:ext>
                 </a:extLst>
               </p:cNvPr>
@@ -16994,6 +16044,30 @@
           </p:sp>
         </mc:Fallback>
       </mc:AlternateContent>
+      <p:pic>
+        <p:nvPicPr>
+          <p:cNvPr id="2" name="Image 1"/>
+          <p:cNvPicPr>
+            <a:picLocks noChangeAspect="1"/>
+          </p:cNvPicPr>
+          <p:nvPr/>
+        </p:nvPicPr>
+        <p:blipFill>
+          <a:blip r:embed="rId3"/>
+          <a:stretch>
+            <a:fillRect/>
+          </a:stretch>
+        </p:blipFill>
+        <p:spPr>
+          <a:xfrm>
+            <a:off x="2915190" y="1980142"/>
+            <a:ext cx="6311799" cy="4733849"/>
+          </a:xfrm>
+          <a:prstGeom prst="rect">
+            <a:avLst/>
+          </a:prstGeom>
+        </p:spPr>
+      </p:pic>
     </p:spTree>
     <p:extLst>
       <p:ext uri="{BB962C8B-B14F-4D97-AF65-F5344CB8AC3E}">
@@ -17229,7 +16303,7 @@
               <p:cNvPr id="28" name="ZoneTexte 27">
                 <a:extLst>
                   <a:ext uri="{FF2B5EF4-FFF2-40B4-BE49-F238E27FC236}">
-                    <a16:creationId xmlns:a16="http://schemas.microsoft.com/office/drawing/2014/main" xmlns="" id="{B2AD1845-005D-4D56-8DD3-7B8026BCC5A3}"/>
+                    <a16:creationId xmlns="" xmlns:a16="http://schemas.microsoft.com/office/drawing/2014/main" id="{B2AD1845-005D-4D56-8DD3-7B8026BCC5A3}"/>
                   </a:ext>
                 </a:extLst>
               </p:cNvPr>
@@ -17735,7 +16809,7 @@
               <p:cNvPr id="29" name="ZoneTexte 28">
                 <a:extLst>
                   <a:ext uri="{FF2B5EF4-FFF2-40B4-BE49-F238E27FC236}">
-                    <a16:creationId xmlns:a16="http://schemas.microsoft.com/office/drawing/2014/main" xmlns="" id="{B2AD1845-005D-4D56-8DD3-7B8026BCC5A3}"/>
+                    <a16:creationId xmlns="" xmlns:a16="http://schemas.microsoft.com/office/drawing/2014/main" id="{B2AD1845-005D-4D56-8DD3-7B8026BCC5A3}"/>
                   </a:ext>
                 </a:extLst>
               </p:cNvPr>

</xml_diff>